<commit_message>
Implement Change ThingCategory Icon
</commit_message>
<xml_diff>
--- a/Docs/Components.pptx
+++ b/Docs/Components.pptx
@@ -5,7 +5,9 @@
     <p:sldMasterId id="2147483648" r:id="rId1"/>
   </p:sldMasterIdLst>
   <p:sldIdLst>
-    <p:sldId id="256" r:id="rId2"/>
+    <p:sldId id="258" r:id="rId2"/>
+    <p:sldId id="256" r:id="rId3"/>
+    <p:sldId id="257" r:id="rId4"/>
   </p:sldIdLst>
   <p:sldSz cx="12192000" cy="6858000"/>
   <p:notesSz cx="6858000" cy="9144000"/>
@@ -165,10 +167,9 @@
           </a:lstStyle>
           <a:p>
             <a:r>
-              <a:rPr lang="en-US" smtClean="0"/>
+              <a:rPr lang="en-US"/>
               <a:t>Click to edit Master title style</a:t>
             </a:r>
-            <a:endParaRPr lang="en-US"/>
           </a:p>
         </p:txBody>
       </p:sp>
@@ -195,45 +196,44 @@
               <a:buNone/>
               <a:defRPr sz="2400"/>
             </a:lvl1pPr>
-            <a:lvl2pPr marL="457200" indent="0" algn="ctr">
+            <a:lvl2pPr marL="457178" indent="0" algn="ctr">
               <a:buNone/>
               <a:defRPr sz="2000"/>
             </a:lvl2pPr>
-            <a:lvl3pPr marL="914400" indent="0" algn="ctr">
+            <a:lvl3pPr marL="914354" indent="0" algn="ctr">
               <a:buNone/>
               <a:defRPr sz="1800"/>
             </a:lvl3pPr>
-            <a:lvl4pPr marL="1371600" indent="0" algn="ctr">
+            <a:lvl4pPr marL="1371532" indent="0" algn="ctr">
               <a:buNone/>
               <a:defRPr sz="1600"/>
             </a:lvl4pPr>
-            <a:lvl5pPr marL="1828800" indent="0" algn="ctr">
+            <a:lvl5pPr marL="1828709" indent="0" algn="ctr">
               <a:buNone/>
               <a:defRPr sz="1600"/>
             </a:lvl5pPr>
-            <a:lvl6pPr marL="2286000" indent="0" algn="ctr">
+            <a:lvl6pPr marL="2285886" indent="0" algn="ctr">
               <a:buNone/>
               <a:defRPr sz="1600"/>
             </a:lvl6pPr>
-            <a:lvl7pPr marL="2743200" indent="0" algn="ctr">
+            <a:lvl7pPr marL="2743062" indent="0" algn="ctr">
               <a:buNone/>
               <a:defRPr sz="1600"/>
             </a:lvl7pPr>
-            <a:lvl8pPr marL="3200400" indent="0" algn="ctr">
+            <a:lvl8pPr marL="3200240" indent="0" algn="ctr">
               <a:buNone/>
               <a:defRPr sz="1600"/>
             </a:lvl8pPr>
-            <a:lvl9pPr marL="3657600" indent="0" algn="ctr">
+            <a:lvl9pPr marL="3657418" indent="0" algn="ctr">
               <a:buNone/>
               <a:defRPr sz="1600"/>
             </a:lvl9pPr>
           </a:lstStyle>
           <a:p>
             <a:r>
-              <a:rPr lang="en-US" smtClean="0"/>
+              <a:rPr lang="en-US"/>
               <a:t>Click to edit Master subtitle style</a:t>
             </a:r>
-            <a:endParaRPr lang="en-US"/>
           </a:p>
         </p:txBody>
       </p:sp>
@@ -254,7 +254,7 @@
           <a:p>
             <a:fld id="{9A3B8A51-A5DE-4603-912D-5D6944814557}" type="datetimeFigureOut">
               <a:rPr lang="en-US" smtClean="0"/>
-              <a:t>5/19/2016</a:t>
+              <a:t>10/17/2016</a:t>
             </a:fld>
             <a:endParaRPr lang="en-US"/>
           </a:p>
@@ -348,10 +348,9 @@
           <a:lstStyle/>
           <a:p>
             <a:r>
-              <a:rPr lang="en-US" smtClean="0"/>
+              <a:rPr lang="en-US"/>
               <a:t>Click to edit Master title style</a:t>
             </a:r>
-            <a:endParaRPr lang="en-US"/>
           </a:p>
         </p:txBody>
       </p:sp>
@@ -372,38 +371,37 @@
           <a:p>
             <a:pPr lvl="0"/>
             <a:r>
-              <a:rPr lang="en-US" smtClean="0"/>
+              <a:rPr lang="en-US"/>
               <a:t>Click to edit Master text styles</a:t>
             </a:r>
           </a:p>
           <a:p>
             <a:pPr lvl="1"/>
             <a:r>
-              <a:rPr lang="en-US" smtClean="0"/>
+              <a:rPr lang="en-US"/>
               <a:t>Second level</a:t>
             </a:r>
           </a:p>
           <a:p>
             <a:pPr lvl="2"/>
             <a:r>
-              <a:rPr lang="en-US" smtClean="0"/>
+              <a:rPr lang="en-US"/>
               <a:t>Third level</a:t>
             </a:r>
           </a:p>
           <a:p>
             <a:pPr lvl="3"/>
             <a:r>
-              <a:rPr lang="en-US" smtClean="0"/>
+              <a:rPr lang="en-US"/>
               <a:t>Fourth level</a:t>
             </a:r>
           </a:p>
           <a:p>
             <a:pPr lvl="4"/>
             <a:r>
-              <a:rPr lang="en-US" smtClean="0"/>
+              <a:rPr lang="en-US"/>
               <a:t>Fifth level</a:t>
             </a:r>
-            <a:endParaRPr lang="en-US"/>
           </a:p>
         </p:txBody>
       </p:sp>
@@ -424,7 +422,7 @@
           <a:p>
             <a:fld id="{9A3B8A51-A5DE-4603-912D-5D6944814557}" type="datetimeFigureOut">
               <a:rPr lang="en-US" smtClean="0"/>
-              <a:t>5/19/2016</a:t>
+              <a:t>10/17/2016</a:t>
             </a:fld>
             <a:endParaRPr lang="en-US"/>
           </a:p>
@@ -514,7 +512,7 @@
         </p:nvSpPr>
         <p:spPr>
           <a:xfrm>
-            <a:off x="8724900" y="365125"/>
+            <a:off x="8724902" y="365125"/>
             <a:ext cx="2628900" cy="5811838"/>
           </a:xfrm>
         </p:spPr>
@@ -523,10 +521,9 @@
           <a:lstStyle/>
           <a:p>
             <a:r>
-              <a:rPr lang="en-US" smtClean="0"/>
+              <a:rPr lang="en-US"/>
               <a:t>Click to edit Master title style</a:t>
             </a:r>
-            <a:endParaRPr lang="en-US"/>
           </a:p>
         </p:txBody>
       </p:sp>
@@ -542,7 +539,7 @@
         </p:nvSpPr>
         <p:spPr>
           <a:xfrm>
-            <a:off x="838200" y="365125"/>
+            <a:off x="838203" y="365125"/>
             <a:ext cx="7734300" cy="5811838"/>
           </a:xfrm>
         </p:spPr>
@@ -552,38 +549,37 @@
           <a:p>
             <a:pPr lvl="0"/>
             <a:r>
-              <a:rPr lang="en-US" smtClean="0"/>
+              <a:rPr lang="en-US"/>
               <a:t>Click to edit Master text styles</a:t>
             </a:r>
           </a:p>
           <a:p>
             <a:pPr lvl="1"/>
             <a:r>
-              <a:rPr lang="en-US" smtClean="0"/>
+              <a:rPr lang="en-US"/>
               <a:t>Second level</a:t>
             </a:r>
           </a:p>
           <a:p>
             <a:pPr lvl="2"/>
             <a:r>
-              <a:rPr lang="en-US" smtClean="0"/>
+              <a:rPr lang="en-US"/>
               <a:t>Third level</a:t>
             </a:r>
           </a:p>
           <a:p>
             <a:pPr lvl="3"/>
             <a:r>
-              <a:rPr lang="en-US" smtClean="0"/>
+              <a:rPr lang="en-US"/>
               <a:t>Fourth level</a:t>
             </a:r>
           </a:p>
           <a:p>
             <a:pPr lvl="4"/>
             <a:r>
-              <a:rPr lang="en-US" smtClean="0"/>
+              <a:rPr lang="en-US"/>
               <a:t>Fifth level</a:t>
             </a:r>
-            <a:endParaRPr lang="en-US"/>
           </a:p>
         </p:txBody>
       </p:sp>
@@ -604,7 +600,7 @@
           <a:p>
             <a:fld id="{9A3B8A51-A5DE-4603-912D-5D6944814557}" type="datetimeFigureOut">
               <a:rPr lang="en-US" smtClean="0"/>
-              <a:t>5/19/2016</a:t>
+              <a:t>10/17/2016</a:t>
             </a:fld>
             <a:endParaRPr lang="en-US"/>
           </a:p>
@@ -698,10 +694,9 @@
           <a:lstStyle/>
           <a:p>
             <a:r>
-              <a:rPr lang="en-US" smtClean="0"/>
+              <a:rPr lang="en-US"/>
               <a:t>Click to edit Master title style</a:t>
             </a:r>
-            <a:endParaRPr lang="en-US"/>
           </a:p>
         </p:txBody>
       </p:sp>
@@ -722,38 +717,37 @@
           <a:p>
             <a:pPr lvl="0"/>
             <a:r>
-              <a:rPr lang="en-US" smtClean="0"/>
+              <a:rPr lang="en-US"/>
               <a:t>Click to edit Master text styles</a:t>
             </a:r>
           </a:p>
           <a:p>
             <a:pPr lvl="1"/>
             <a:r>
-              <a:rPr lang="en-US" smtClean="0"/>
+              <a:rPr lang="en-US"/>
               <a:t>Second level</a:t>
             </a:r>
           </a:p>
           <a:p>
             <a:pPr lvl="2"/>
             <a:r>
-              <a:rPr lang="en-US" smtClean="0"/>
+              <a:rPr lang="en-US"/>
               <a:t>Third level</a:t>
             </a:r>
           </a:p>
           <a:p>
             <a:pPr lvl="3"/>
             <a:r>
-              <a:rPr lang="en-US" smtClean="0"/>
+              <a:rPr lang="en-US"/>
               <a:t>Fourth level</a:t>
             </a:r>
           </a:p>
           <a:p>
             <a:pPr lvl="4"/>
             <a:r>
-              <a:rPr lang="en-US" smtClean="0"/>
+              <a:rPr lang="en-US"/>
               <a:t>Fifth level</a:t>
             </a:r>
-            <a:endParaRPr lang="en-US"/>
           </a:p>
         </p:txBody>
       </p:sp>
@@ -774,7 +768,7 @@
           <a:p>
             <a:fld id="{9A3B8A51-A5DE-4603-912D-5D6944814557}" type="datetimeFigureOut">
               <a:rPr lang="en-US" smtClean="0"/>
-              <a:t>5/19/2016</a:t>
+              <a:t>10/17/2016</a:t>
             </a:fld>
             <a:endParaRPr lang="en-US"/>
           </a:p>
@@ -864,7 +858,7 @@
         </p:nvSpPr>
         <p:spPr>
           <a:xfrm>
-            <a:off x="831850" y="1709738"/>
+            <a:off x="831851" y="1709744"/>
             <a:ext cx="10515600" cy="2852737"/>
           </a:xfrm>
         </p:spPr>
@@ -877,10 +871,9 @@
           </a:lstStyle>
           <a:p>
             <a:r>
-              <a:rPr lang="en-US" smtClean="0"/>
+              <a:rPr lang="en-US"/>
               <a:t>Click to edit Master title style</a:t>
             </a:r>
-            <a:endParaRPr lang="en-US"/>
           </a:p>
         </p:txBody>
       </p:sp>
@@ -896,7 +889,7 @@
         </p:nvSpPr>
         <p:spPr>
           <a:xfrm>
-            <a:off x="831850" y="4589463"/>
+            <a:off x="831851" y="4589469"/>
             <a:ext cx="10515600" cy="1500187"/>
           </a:xfrm>
         </p:spPr>
@@ -913,7 +906,7 @@
                 </a:solidFill>
               </a:defRPr>
             </a:lvl1pPr>
-            <a:lvl2pPr marL="457200" indent="0">
+            <a:lvl2pPr marL="457178" indent="0">
               <a:buNone/>
               <a:defRPr sz="2000">
                 <a:solidFill>
@@ -923,7 +916,7 @@
                 </a:solidFill>
               </a:defRPr>
             </a:lvl2pPr>
-            <a:lvl3pPr marL="914400" indent="0">
+            <a:lvl3pPr marL="914354" indent="0">
               <a:buNone/>
               <a:defRPr sz="1800">
                 <a:solidFill>
@@ -933,7 +926,7 @@
                 </a:solidFill>
               </a:defRPr>
             </a:lvl3pPr>
-            <a:lvl4pPr marL="1371600" indent="0">
+            <a:lvl4pPr marL="1371532" indent="0">
               <a:buNone/>
               <a:defRPr sz="1600">
                 <a:solidFill>
@@ -943,7 +936,7 @@
                 </a:solidFill>
               </a:defRPr>
             </a:lvl4pPr>
-            <a:lvl5pPr marL="1828800" indent="0">
+            <a:lvl5pPr marL="1828709" indent="0">
               <a:buNone/>
               <a:defRPr sz="1600">
                 <a:solidFill>
@@ -953,7 +946,7 @@
                 </a:solidFill>
               </a:defRPr>
             </a:lvl5pPr>
-            <a:lvl6pPr marL="2286000" indent="0">
+            <a:lvl6pPr marL="2285886" indent="0">
               <a:buNone/>
               <a:defRPr sz="1600">
                 <a:solidFill>
@@ -963,7 +956,7 @@
                 </a:solidFill>
               </a:defRPr>
             </a:lvl6pPr>
-            <a:lvl7pPr marL="2743200" indent="0">
+            <a:lvl7pPr marL="2743062" indent="0">
               <a:buNone/>
               <a:defRPr sz="1600">
                 <a:solidFill>
@@ -973,7 +966,7 @@
                 </a:solidFill>
               </a:defRPr>
             </a:lvl7pPr>
-            <a:lvl8pPr marL="3200400" indent="0">
+            <a:lvl8pPr marL="3200240" indent="0">
               <a:buNone/>
               <a:defRPr sz="1600">
                 <a:solidFill>
@@ -983,7 +976,7 @@
                 </a:solidFill>
               </a:defRPr>
             </a:lvl8pPr>
-            <a:lvl9pPr marL="3657600" indent="0">
+            <a:lvl9pPr marL="3657418" indent="0">
               <a:buNone/>
               <a:defRPr sz="1600">
                 <a:solidFill>
@@ -997,7 +990,7 @@
           <a:p>
             <a:pPr lvl="0"/>
             <a:r>
-              <a:rPr lang="en-US" smtClean="0"/>
+              <a:rPr lang="en-US"/>
               <a:t>Click to edit Master text styles</a:t>
             </a:r>
           </a:p>
@@ -1020,7 +1013,7 @@
           <a:p>
             <a:fld id="{9A3B8A51-A5DE-4603-912D-5D6944814557}" type="datetimeFigureOut">
               <a:rPr lang="en-US" smtClean="0"/>
-              <a:t>5/19/2016</a:t>
+              <a:t>10/17/2016</a:t>
             </a:fld>
             <a:endParaRPr lang="en-US"/>
           </a:p>
@@ -1114,10 +1107,9 @@
           <a:lstStyle/>
           <a:p>
             <a:r>
-              <a:rPr lang="en-US" smtClean="0"/>
+              <a:rPr lang="en-US"/>
               <a:t>Click to edit Master title style</a:t>
             </a:r>
-            <a:endParaRPr lang="en-US"/>
           </a:p>
         </p:txBody>
       </p:sp>
@@ -1143,38 +1135,37 @@
           <a:p>
             <a:pPr lvl="0"/>
             <a:r>
-              <a:rPr lang="en-US" smtClean="0"/>
+              <a:rPr lang="en-US"/>
               <a:t>Click to edit Master text styles</a:t>
             </a:r>
           </a:p>
           <a:p>
             <a:pPr lvl="1"/>
             <a:r>
-              <a:rPr lang="en-US" smtClean="0"/>
+              <a:rPr lang="en-US"/>
               <a:t>Second level</a:t>
             </a:r>
           </a:p>
           <a:p>
             <a:pPr lvl="2"/>
             <a:r>
-              <a:rPr lang="en-US" smtClean="0"/>
+              <a:rPr lang="en-US"/>
               <a:t>Third level</a:t>
             </a:r>
           </a:p>
           <a:p>
             <a:pPr lvl="3"/>
             <a:r>
-              <a:rPr lang="en-US" smtClean="0"/>
+              <a:rPr lang="en-US"/>
               <a:t>Fourth level</a:t>
             </a:r>
           </a:p>
           <a:p>
             <a:pPr lvl="4"/>
             <a:r>
-              <a:rPr lang="en-US" smtClean="0"/>
+              <a:rPr lang="en-US"/>
               <a:t>Fifth level</a:t>
             </a:r>
-            <a:endParaRPr lang="en-US"/>
           </a:p>
         </p:txBody>
       </p:sp>
@@ -1200,38 +1191,37 @@
           <a:p>
             <a:pPr lvl="0"/>
             <a:r>
-              <a:rPr lang="en-US" smtClean="0"/>
+              <a:rPr lang="en-US"/>
               <a:t>Click to edit Master text styles</a:t>
             </a:r>
           </a:p>
           <a:p>
             <a:pPr lvl="1"/>
             <a:r>
-              <a:rPr lang="en-US" smtClean="0"/>
+              <a:rPr lang="en-US"/>
               <a:t>Second level</a:t>
             </a:r>
           </a:p>
           <a:p>
             <a:pPr lvl="2"/>
             <a:r>
-              <a:rPr lang="en-US" smtClean="0"/>
+              <a:rPr lang="en-US"/>
               <a:t>Third level</a:t>
             </a:r>
           </a:p>
           <a:p>
             <a:pPr lvl="3"/>
             <a:r>
-              <a:rPr lang="en-US" smtClean="0"/>
+              <a:rPr lang="en-US"/>
               <a:t>Fourth level</a:t>
             </a:r>
           </a:p>
           <a:p>
             <a:pPr lvl="4"/>
             <a:r>
-              <a:rPr lang="en-US" smtClean="0"/>
+              <a:rPr lang="en-US"/>
               <a:t>Fifth level</a:t>
             </a:r>
-            <a:endParaRPr lang="en-US"/>
           </a:p>
         </p:txBody>
       </p:sp>
@@ -1252,7 +1242,7 @@
           <a:p>
             <a:fld id="{9A3B8A51-A5DE-4603-912D-5D6944814557}" type="datetimeFigureOut">
               <a:rPr lang="en-US" smtClean="0"/>
-              <a:t>5/19/2016</a:t>
+              <a:t>10/17/2016</a:t>
             </a:fld>
             <a:endParaRPr lang="en-US"/>
           </a:p>
@@ -1342,7 +1332,7 @@
         </p:nvSpPr>
         <p:spPr>
           <a:xfrm>
-            <a:off x="839788" y="365125"/>
+            <a:off x="839788" y="365129"/>
             <a:ext cx="10515600" cy="1325563"/>
           </a:xfrm>
         </p:spPr>
@@ -1351,10 +1341,9 @@
           <a:lstStyle/>
           <a:p>
             <a:r>
-              <a:rPr lang="en-US" smtClean="0"/>
+              <a:rPr lang="en-US"/>
               <a:t>Click to edit Master title style</a:t>
             </a:r>
-            <a:endParaRPr lang="en-US"/>
           </a:p>
         </p:txBody>
       </p:sp>
@@ -1370,7 +1359,7 @@
         </p:nvSpPr>
         <p:spPr>
           <a:xfrm>
-            <a:off x="839788" y="1681163"/>
+            <a:off x="839789" y="1681163"/>
             <a:ext cx="5157787" cy="823912"/>
           </a:xfrm>
         </p:spPr>
@@ -1381,35 +1370,35 @@
               <a:buNone/>
               <a:defRPr sz="2400" b="1"/>
             </a:lvl1pPr>
-            <a:lvl2pPr marL="457200" indent="0">
+            <a:lvl2pPr marL="457178" indent="0">
               <a:buNone/>
               <a:defRPr sz="2000" b="1"/>
             </a:lvl2pPr>
-            <a:lvl3pPr marL="914400" indent="0">
+            <a:lvl3pPr marL="914354" indent="0">
               <a:buNone/>
               <a:defRPr sz="1800" b="1"/>
             </a:lvl3pPr>
-            <a:lvl4pPr marL="1371600" indent="0">
+            <a:lvl4pPr marL="1371532" indent="0">
               <a:buNone/>
               <a:defRPr sz="1600" b="1"/>
             </a:lvl4pPr>
-            <a:lvl5pPr marL="1828800" indent="0">
+            <a:lvl5pPr marL="1828709" indent="0">
               <a:buNone/>
               <a:defRPr sz="1600" b="1"/>
             </a:lvl5pPr>
-            <a:lvl6pPr marL="2286000" indent="0">
+            <a:lvl6pPr marL="2285886" indent="0">
               <a:buNone/>
               <a:defRPr sz="1600" b="1"/>
             </a:lvl6pPr>
-            <a:lvl7pPr marL="2743200" indent="0">
+            <a:lvl7pPr marL="2743062" indent="0">
               <a:buNone/>
               <a:defRPr sz="1600" b="1"/>
             </a:lvl7pPr>
-            <a:lvl8pPr marL="3200400" indent="0">
+            <a:lvl8pPr marL="3200240" indent="0">
               <a:buNone/>
               <a:defRPr sz="1600" b="1"/>
             </a:lvl8pPr>
-            <a:lvl9pPr marL="3657600" indent="0">
+            <a:lvl9pPr marL="3657418" indent="0">
               <a:buNone/>
               <a:defRPr sz="1600" b="1"/>
             </a:lvl9pPr>
@@ -1417,7 +1406,7 @@
           <a:p>
             <a:pPr lvl="0"/>
             <a:r>
-              <a:rPr lang="en-US" smtClean="0"/>
+              <a:rPr lang="en-US"/>
               <a:t>Click to edit Master text styles</a:t>
             </a:r>
           </a:p>
@@ -1435,7 +1424,7 @@
         </p:nvSpPr>
         <p:spPr>
           <a:xfrm>
-            <a:off x="839788" y="2505075"/>
+            <a:off x="839789" y="2505075"/>
             <a:ext cx="5157787" cy="3684588"/>
           </a:xfrm>
         </p:spPr>
@@ -1445,38 +1434,37 @@
           <a:p>
             <a:pPr lvl="0"/>
             <a:r>
-              <a:rPr lang="en-US" smtClean="0"/>
+              <a:rPr lang="en-US"/>
               <a:t>Click to edit Master text styles</a:t>
             </a:r>
           </a:p>
           <a:p>
             <a:pPr lvl="1"/>
             <a:r>
-              <a:rPr lang="en-US" smtClean="0"/>
+              <a:rPr lang="en-US"/>
               <a:t>Second level</a:t>
             </a:r>
           </a:p>
           <a:p>
             <a:pPr lvl="2"/>
             <a:r>
-              <a:rPr lang="en-US" smtClean="0"/>
+              <a:rPr lang="en-US"/>
               <a:t>Third level</a:t>
             </a:r>
           </a:p>
           <a:p>
             <a:pPr lvl="3"/>
             <a:r>
-              <a:rPr lang="en-US" smtClean="0"/>
+              <a:rPr lang="en-US"/>
               <a:t>Fourth level</a:t>
             </a:r>
           </a:p>
           <a:p>
             <a:pPr lvl="4"/>
             <a:r>
-              <a:rPr lang="en-US" smtClean="0"/>
+              <a:rPr lang="en-US"/>
               <a:t>Fifth level</a:t>
             </a:r>
-            <a:endParaRPr lang="en-US"/>
           </a:p>
         </p:txBody>
       </p:sp>
@@ -1492,7 +1480,7 @@
         </p:nvSpPr>
         <p:spPr>
           <a:xfrm>
-            <a:off x="6172200" y="1681163"/>
+            <a:off x="6172203" y="1681163"/>
             <a:ext cx="5183188" cy="823912"/>
           </a:xfrm>
         </p:spPr>
@@ -1503,35 +1491,35 @@
               <a:buNone/>
               <a:defRPr sz="2400" b="1"/>
             </a:lvl1pPr>
-            <a:lvl2pPr marL="457200" indent="0">
+            <a:lvl2pPr marL="457178" indent="0">
               <a:buNone/>
               <a:defRPr sz="2000" b="1"/>
             </a:lvl2pPr>
-            <a:lvl3pPr marL="914400" indent="0">
+            <a:lvl3pPr marL="914354" indent="0">
               <a:buNone/>
               <a:defRPr sz="1800" b="1"/>
             </a:lvl3pPr>
-            <a:lvl4pPr marL="1371600" indent="0">
+            <a:lvl4pPr marL="1371532" indent="0">
               <a:buNone/>
               <a:defRPr sz="1600" b="1"/>
             </a:lvl4pPr>
-            <a:lvl5pPr marL="1828800" indent="0">
+            <a:lvl5pPr marL="1828709" indent="0">
               <a:buNone/>
               <a:defRPr sz="1600" b="1"/>
             </a:lvl5pPr>
-            <a:lvl6pPr marL="2286000" indent="0">
+            <a:lvl6pPr marL="2285886" indent="0">
               <a:buNone/>
               <a:defRPr sz="1600" b="1"/>
             </a:lvl6pPr>
-            <a:lvl7pPr marL="2743200" indent="0">
+            <a:lvl7pPr marL="2743062" indent="0">
               <a:buNone/>
               <a:defRPr sz="1600" b="1"/>
             </a:lvl7pPr>
-            <a:lvl8pPr marL="3200400" indent="0">
+            <a:lvl8pPr marL="3200240" indent="0">
               <a:buNone/>
               <a:defRPr sz="1600" b="1"/>
             </a:lvl8pPr>
-            <a:lvl9pPr marL="3657600" indent="0">
+            <a:lvl9pPr marL="3657418" indent="0">
               <a:buNone/>
               <a:defRPr sz="1600" b="1"/>
             </a:lvl9pPr>
@@ -1539,7 +1527,7 @@
           <a:p>
             <a:pPr lvl="0"/>
             <a:r>
-              <a:rPr lang="en-US" smtClean="0"/>
+              <a:rPr lang="en-US"/>
               <a:t>Click to edit Master text styles</a:t>
             </a:r>
           </a:p>
@@ -1557,7 +1545,7 @@
         </p:nvSpPr>
         <p:spPr>
           <a:xfrm>
-            <a:off x="6172200" y="2505075"/>
+            <a:off x="6172203" y="2505075"/>
             <a:ext cx="5183188" cy="3684588"/>
           </a:xfrm>
         </p:spPr>
@@ -1567,38 +1555,37 @@
           <a:p>
             <a:pPr lvl="0"/>
             <a:r>
-              <a:rPr lang="en-US" smtClean="0"/>
+              <a:rPr lang="en-US"/>
               <a:t>Click to edit Master text styles</a:t>
             </a:r>
           </a:p>
           <a:p>
             <a:pPr lvl="1"/>
             <a:r>
-              <a:rPr lang="en-US" smtClean="0"/>
+              <a:rPr lang="en-US"/>
               <a:t>Second level</a:t>
             </a:r>
           </a:p>
           <a:p>
             <a:pPr lvl="2"/>
             <a:r>
-              <a:rPr lang="en-US" smtClean="0"/>
+              <a:rPr lang="en-US"/>
               <a:t>Third level</a:t>
             </a:r>
           </a:p>
           <a:p>
             <a:pPr lvl="3"/>
             <a:r>
-              <a:rPr lang="en-US" smtClean="0"/>
+              <a:rPr lang="en-US"/>
               <a:t>Fourth level</a:t>
             </a:r>
           </a:p>
           <a:p>
             <a:pPr lvl="4"/>
             <a:r>
-              <a:rPr lang="en-US" smtClean="0"/>
+              <a:rPr lang="en-US"/>
               <a:t>Fifth level</a:t>
             </a:r>
-            <a:endParaRPr lang="en-US"/>
           </a:p>
         </p:txBody>
       </p:sp>
@@ -1619,7 +1606,7 @@
           <a:p>
             <a:fld id="{9A3B8A51-A5DE-4603-912D-5D6944814557}" type="datetimeFigureOut">
               <a:rPr lang="en-US" smtClean="0"/>
-              <a:t>5/19/2016</a:t>
+              <a:t>10/17/2016</a:t>
             </a:fld>
             <a:endParaRPr lang="en-US"/>
           </a:p>
@@ -1713,10 +1700,9 @@
           <a:lstStyle/>
           <a:p>
             <a:r>
-              <a:rPr lang="en-US" smtClean="0"/>
+              <a:rPr lang="en-US"/>
               <a:t>Click to edit Master title style</a:t>
             </a:r>
-            <a:endParaRPr lang="en-US"/>
           </a:p>
         </p:txBody>
       </p:sp>
@@ -1737,7 +1723,7 @@
           <a:p>
             <a:fld id="{9A3B8A51-A5DE-4603-912D-5D6944814557}" type="datetimeFigureOut">
               <a:rPr lang="en-US" smtClean="0"/>
-              <a:t>5/19/2016</a:t>
+              <a:t>10/17/2016</a:t>
             </a:fld>
             <a:endParaRPr lang="en-US"/>
           </a:p>
@@ -1832,7 +1818,7 @@
           <a:p>
             <a:fld id="{9A3B8A51-A5DE-4603-912D-5D6944814557}" type="datetimeFigureOut">
               <a:rPr lang="en-US" smtClean="0"/>
-              <a:t>5/19/2016</a:t>
+              <a:t>10/17/2016</a:t>
             </a:fld>
             <a:endParaRPr lang="en-US"/>
           </a:p>
@@ -1935,10 +1921,9 @@
           </a:lstStyle>
           <a:p>
             <a:r>
-              <a:rPr lang="en-US" smtClean="0"/>
+              <a:rPr lang="en-US"/>
               <a:t>Click to edit Master title style</a:t>
             </a:r>
-            <a:endParaRPr lang="en-US"/>
           </a:p>
         </p:txBody>
       </p:sp>
@@ -1954,7 +1939,7 @@
         </p:nvSpPr>
         <p:spPr>
           <a:xfrm>
-            <a:off x="5183188" y="987425"/>
+            <a:off x="5183188" y="987431"/>
             <a:ext cx="6172200" cy="4873625"/>
           </a:xfrm>
         </p:spPr>
@@ -1992,38 +1977,37 @@
           <a:p>
             <a:pPr lvl="0"/>
             <a:r>
-              <a:rPr lang="en-US" smtClean="0"/>
+              <a:rPr lang="en-US"/>
               <a:t>Click to edit Master text styles</a:t>
             </a:r>
           </a:p>
           <a:p>
             <a:pPr lvl="1"/>
             <a:r>
-              <a:rPr lang="en-US" smtClean="0"/>
+              <a:rPr lang="en-US"/>
               <a:t>Second level</a:t>
             </a:r>
           </a:p>
           <a:p>
             <a:pPr lvl="2"/>
             <a:r>
-              <a:rPr lang="en-US" smtClean="0"/>
+              <a:rPr lang="en-US"/>
               <a:t>Third level</a:t>
             </a:r>
           </a:p>
           <a:p>
             <a:pPr lvl="3"/>
             <a:r>
-              <a:rPr lang="en-US" smtClean="0"/>
+              <a:rPr lang="en-US"/>
               <a:t>Fourth level</a:t>
             </a:r>
           </a:p>
           <a:p>
             <a:pPr lvl="4"/>
             <a:r>
-              <a:rPr lang="en-US" smtClean="0"/>
+              <a:rPr lang="en-US"/>
               <a:t>Fifth level</a:t>
             </a:r>
-            <a:endParaRPr lang="en-US"/>
           </a:p>
         </p:txBody>
       </p:sp>
@@ -2050,35 +2034,35 @@
               <a:buNone/>
               <a:defRPr sz="1600"/>
             </a:lvl1pPr>
-            <a:lvl2pPr marL="457200" indent="0">
+            <a:lvl2pPr marL="457178" indent="0">
               <a:buNone/>
               <a:defRPr sz="1400"/>
             </a:lvl2pPr>
-            <a:lvl3pPr marL="914400" indent="0">
+            <a:lvl3pPr marL="914354" indent="0">
               <a:buNone/>
               <a:defRPr sz="1200"/>
             </a:lvl3pPr>
-            <a:lvl4pPr marL="1371600" indent="0">
+            <a:lvl4pPr marL="1371532" indent="0">
               <a:buNone/>
               <a:defRPr sz="1000"/>
             </a:lvl4pPr>
-            <a:lvl5pPr marL="1828800" indent="0">
+            <a:lvl5pPr marL="1828709" indent="0">
               <a:buNone/>
               <a:defRPr sz="1000"/>
             </a:lvl5pPr>
-            <a:lvl6pPr marL="2286000" indent="0">
+            <a:lvl6pPr marL="2285886" indent="0">
               <a:buNone/>
               <a:defRPr sz="1000"/>
             </a:lvl6pPr>
-            <a:lvl7pPr marL="2743200" indent="0">
+            <a:lvl7pPr marL="2743062" indent="0">
               <a:buNone/>
               <a:defRPr sz="1000"/>
             </a:lvl7pPr>
-            <a:lvl8pPr marL="3200400" indent="0">
+            <a:lvl8pPr marL="3200240" indent="0">
               <a:buNone/>
               <a:defRPr sz="1000"/>
             </a:lvl8pPr>
-            <a:lvl9pPr marL="3657600" indent="0">
+            <a:lvl9pPr marL="3657418" indent="0">
               <a:buNone/>
               <a:defRPr sz="1000"/>
             </a:lvl9pPr>
@@ -2086,7 +2070,7 @@
           <a:p>
             <a:pPr lvl="0"/>
             <a:r>
-              <a:rPr lang="en-US" smtClean="0"/>
+              <a:rPr lang="en-US"/>
               <a:t>Click to edit Master text styles</a:t>
             </a:r>
           </a:p>
@@ -2109,7 +2093,7 @@
           <a:p>
             <a:fld id="{9A3B8A51-A5DE-4603-912D-5D6944814557}" type="datetimeFigureOut">
               <a:rPr lang="en-US" smtClean="0"/>
-              <a:t>5/19/2016</a:t>
+              <a:t>10/17/2016</a:t>
             </a:fld>
             <a:endParaRPr lang="en-US"/>
           </a:p>
@@ -2212,10 +2196,9 @@
           </a:lstStyle>
           <a:p>
             <a:r>
-              <a:rPr lang="en-US" smtClean="0"/>
+              <a:rPr lang="en-US"/>
               <a:t>Click to edit Master title style</a:t>
             </a:r>
-            <a:endParaRPr lang="en-US"/>
           </a:p>
         </p:txBody>
       </p:sp>
@@ -2231,7 +2214,7 @@
         </p:nvSpPr>
         <p:spPr>
           <a:xfrm>
-            <a:off x="5183188" y="987425"/>
+            <a:off x="5183188" y="987431"/>
             <a:ext cx="6172200" cy="4873625"/>
           </a:xfrm>
         </p:spPr>
@@ -2242,35 +2225,35 @@
               <a:buNone/>
               <a:defRPr sz="3200"/>
             </a:lvl1pPr>
-            <a:lvl2pPr marL="457200" indent="0">
+            <a:lvl2pPr marL="457178" indent="0">
               <a:buNone/>
               <a:defRPr sz="2800"/>
             </a:lvl2pPr>
-            <a:lvl3pPr marL="914400" indent="0">
+            <a:lvl3pPr marL="914354" indent="0">
               <a:buNone/>
               <a:defRPr sz="2400"/>
             </a:lvl3pPr>
-            <a:lvl4pPr marL="1371600" indent="0">
+            <a:lvl4pPr marL="1371532" indent="0">
               <a:buNone/>
               <a:defRPr sz="2000"/>
             </a:lvl4pPr>
-            <a:lvl5pPr marL="1828800" indent="0">
+            <a:lvl5pPr marL="1828709" indent="0">
               <a:buNone/>
               <a:defRPr sz="2000"/>
             </a:lvl5pPr>
-            <a:lvl6pPr marL="2286000" indent="0">
+            <a:lvl6pPr marL="2285886" indent="0">
               <a:buNone/>
               <a:defRPr sz="2000"/>
             </a:lvl6pPr>
-            <a:lvl7pPr marL="2743200" indent="0">
+            <a:lvl7pPr marL="2743062" indent="0">
               <a:buNone/>
               <a:defRPr sz="2000"/>
             </a:lvl7pPr>
-            <a:lvl8pPr marL="3200400" indent="0">
+            <a:lvl8pPr marL="3200240" indent="0">
               <a:buNone/>
               <a:defRPr sz="2000"/>
             </a:lvl8pPr>
-            <a:lvl9pPr marL="3657600" indent="0">
+            <a:lvl9pPr marL="3657418" indent="0">
               <a:buNone/>
               <a:defRPr sz="2000"/>
             </a:lvl9pPr>
@@ -2303,35 +2286,35 @@
               <a:buNone/>
               <a:defRPr sz="1600"/>
             </a:lvl1pPr>
-            <a:lvl2pPr marL="457200" indent="0">
+            <a:lvl2pPr marL="457178" indent="0">
               <a:buNone/>
               <a:defRPr sz="1400"/>
             </a:lvl2pPr>
-            <a:lvl3pPr marL="914400" indent="0">
+            <a:lvl3pPr marL="914354" indent="0">
               <a:buNone/>
               <a:defRPr sz="1200"/>
             </a:lvl3pPr>
-            <a:lvl4pPr marL="1371600" indent="0">
+            <a:lvl4pPr marL="1371532" indent="0">
               <a:buNone/>
               <a:defRPr sz="1000"/>
             </a:lvl4pPr>
-            <a:lvl5pPr marL="1828800" indent="0">
+            <a:lvl5pPr marL="1828709" indent="0">
               <a:buNone/>
               <a:defRPr sz="1000"/>
             </a:lvl5pPr>
-            <a:lvl6pPr marL="2286000" indent="0">
+            <a:lvl6pPr marL="2285886" indent="0">
               <a:buNone/>
               <a:defRPr sz="1000"/>
             </a:lvl6pPr>
-            <a:lvl7pPr marL="2743200" indent="0">
+            <a:lvl7pPr marL="2743062" indent="0">
               <a:buNone/>
               <a:defRPr sz="1000"/>
             </a:lvl7pPr>
-            <a:lvl8pPr marL="3200400" indent="0">
+            <a:lvl8pPr marL="3200240" indent="0">
               <a:buNone/>
               <a:defRPr sz="1000"/>
             </a:lvl8pPr>
-            <a:lvl9pPr marL="3657600" indent="0">
+            <a:lvl9pPr marL="3657418" indent="0">
               <a:buNone/>
               <a:defRPr sz="1000"/>
             </a:lvl9pPr>
@@ -2339,7 +2322,7 @@
           <a:p>
             <a:pPr lvl="0"/>
             <a:r>
-              <a:rPr lang="en-US" smtClean="0"/>
+              <a:rPr lang="en-US"/>
               <a:t>Click to edit Master text styles</a:t>
             </a:r>
           </a:p>
@@ -2362,7 +2345,7 @@
           <a:p>
             <a:fld id="{9A3B8A51-A5DE-4603-912D-5D6944814557}" type="datetimeFigureOut">
               <a:rPr lang="en-US" smtClean="0"/>
-              <a:t>5/19/2016</a:t>
+              <a:t>10/17/2016</a:t>
             </a:fld>
             <a:endParaRPr lang="en-US"/>
           </a:p>
@@ -2457,7 +2440,7 @@
         </p:nvSpPr>
         <p:spPr>
           <a:xfrm>
-            <a:off x="838200" y="365125"/>
+            <a:off x="838200" y="365129"/>
             <a:ext cx="10515600" cy="1325563"/>
           </a:xfrm>
           <a:prstGeom prst="rect">
@@ -2471,10 +2454,9 @@
           <a:lstStyle/>
           <a:p>
             <a:r>
-              <a:rPr lang="en-US" smtClean="0"/>
+              <a:rPr lang="en-US"/>
               <a:t>Click to edit Master title style</a:t>
             </a:r>
-            <a:endParaRPr lang="en-US"/>
           </a:p>
         </p:txBody>
       </p:sp>
@@ -2505,38 +2487,37 @@
           <a:p>
             <a:pPr lvl="0"/>
             <a:r>
-              <a:rPr lang="en-US" smtClean="0"/>
+              <a:rPr lang="en-US"/>
               <a:t>Click to edit Master text styles</a:t>
             </a:r>
           </a:p>
           <a:p>
             <a:pPr lvl="1"/>
             <a:r>
-              <a:rPr lang="en-US" smtClean="0"/>
+              <a:rPr lang="en-US"/>
               <a:t>Second level</a:t>
             </a:r>
           </a:p>
           <a:p>
             <a:pPr lvl="2"/>
             <a:r>
-              <a:rPr lang="en-US" smtClean="0"/>
+              <a:rPr lang="en-US"/>
               <a:t>Third level</a:t>
             </a:r>
           </a:p>
           <a:p>
             <a:pPr lvl="3"/>
             <a:r>
-              <a:rPr lang="en-US" smtClean="0"/>
+              <a:rPr lang="en-US"/>
               <a:t>Fourth level</a:t>
             </a:r>
           </a:p>
           <a:p>
             <a:pPr lvl="4"/>
             <a:r>
-              <a:rPr lang="en-US" smtClean="0"/>
+              <a:rPr lang="en-US"/>
               <a:t>Fifth level</a:t>
             </a:r>
-            <a:endParaRPr lang="en-US"/>
           </a:p>
         </p:txBody>
       </p:sp>
@@ -2552,7 +2533,7 @@
         </p:nvSpPr>
         <p:spPr>
           <a:xfrm>
-            <a:off x="838200" y="6356350"/>
+            <a:off x="838200" y="6356356"/>
             <a:ext cx="2743200" cy="365125"/>
           </a:xfrm>
           <a:prstGeom prst="rect">
@@ -2575,7 +2556,7 @@
           <a:p>
             <a:fld id="{9A3B8A51-A5DE-4603-912D-5D6944814557}" type="datetimeFigureOut">
               <a:rPr lang="en-US" smtClean="0"/>
-              <a:t>5/19/2016</a:t>
+              <a:t>10/17/2016</a:t>
             </a:fld>
             <a:endParaRPr lang="en-US"/>
           </a:p>
@@ -2593,7 +2574,7 @@
         </p:nvSpPr>
         <p:spPr>
           <a:xfrm>
-            <a:off x="4038600" y="6356350"/>
+            <a:off x="4038600" y="6356356"/>
             <a:ext cx="4114800" cy="365125"/>
           </a:xfrm>
           <a:prstGeom prst="rect">
@@ -2630,7 +2611,7 @@
         </p:nvSpPr>
         <p:spPr>
           <a:xfrm>
-            <a:off x="8610600" y="6356350"/>
+            <a:off x="8610600" y="6356356"/>
             <a:ext cx="2743200" cy="365125"/>
           </a:xfrm>
           <a:prstGeom prst="rect">
@@ -2682,7 +2663,7 @@
   </p:sldLayoutIdLst>
   <p:txStyles>
     <p:titleStyle>
-      <a:lvl1pPr algn="l" defTabSz="914400" rtl="0" eaLnBrk="1" latinLnBrk="0" hangingPunct="1">
+      <a:lvl1pPr algn="l" defTabSz="914354" rtl="0" eaLnBrk="1" latinLnBrk="0" hangingPunct="1">
         <a:lnSpc>
           <a:spcPct val="90000"/>
         </a:lnSpc>
@@ -2701,7 +2682,7 @@
       </a:lvl1pPr>
     </p:titleStyle>
     <p:bodyStyle>
-      <a:lvl1pPr marL="228600" indent="-228600" algn="l" defTabSz="914400" rtl="0" eaLnBrk="1" latinLnBrk="0" hangingPunct="1">
+      <a:lvl1pPr marL="228589" indent="-228589" algn="l" defTabSz="914354" rtl="0" eaLnBrk="1" latinLnBrk="0" hangingPunct="1">
         <a:lnSpc>
           <a:spcPct val="90000"/>
         </a:lnSpc>
@@ -2719,7 +2700,7 @@
           <a:cs typeface="+mn-cs"/>
         </a:defRPr>
       </a:lvl1pPr>
-      <a:lvl2pPr marL="685800" indent="-228600" algn="l" defTabSz="914400" rtl="0" eaLnBrk="1" latinLnBrk="0" hangingPunct="1">
+      <a:lvl2pPr marL="685766" indent="-228589" algn="l" defTabSz="914354" rtl="0" eaLnBrk="1" latinLnBrk="0" hangingPunct="1">
         <a:lnSpc>
           <a:spcPct val="90000"/>
         </a:lnSpc>
@@ -2737,7 +2718,7 @@
           <a:cs typeface="+mn-cs"/>
         </a:defRPr>
       </a:lvl2pPr>
-      <a:lvl3pPr marL="1143000" indent="-228600" algn="l" defTabSz="914400" rtl="0" eaLnBrk="1" latinLnBrk="0" hangingPunct="1">
+      <a:lvl3pPr marL="1142942" indent="-228589" algn="l" defTabSz="914354" rtl="0" eaLnBrk="1" latinLnBrk="0" hangingPunct="1">
         <a:lnSpc>
           <a:spcPct val="90000"/>
         </a:lnSpc>
@@ -2755,7 +2736,7 @@
           <a:cs typeface="+mn-cs"/>
         </a:defRPr>
       </a:lvl3pPr>
-      <a:lvl4pPr marL="1600200" indent="-228600" algn="l" defTabSz="914400" rtl="0" eaLnBrk="1" latinLnBrk="0" hangingPunct="1">
+      <a:lvl4pPr marL="1600120" indent="-228589" algn="l" defTabSz="914354" rtl="0" eaLnBrk="1" latinLnBrk="0" hangingPunct="1">
         <a:lnSpc>
           <a:spcPct val="90000"/>
         </a:lnSpc>
@@ -2773,7 +2754,7 @@
           <a:cs typeface="+mn-cs"/>
         </a:defRPr>
       </a:lvl4pPr>
-      <a:lvl5pPr marL="2057400" indent="-228600" algn="l" defTabSz="914400" rtl="0" eaLnBrk="1" latinLnBrk="0" hangingPunct="1">
+      <a:lvl5pPr marL="2057298" indent="-228589" algn="l" defTabSz="914354" rtl="0" eaLnBrk="1" latinLnBrk="0" hangingPunct="1">
         <a:lnSpc>
           <a:spcPct val="90000"/>
         </a:lnSpc>
@@ -2791,7 +2772,7 @@
           <a:cs typeface="+mn-cs"/>
         </a:defRPr>
       </a:lvl5pPr>
-      <a:lvl6pPr marL="2514600" indent="-228600" algn="l" defTabSz="914400" rtl="0" eaLnBrk="1" latinLnBrk="0" hangingPunct="1">
+      <a:lvl6pPr marL="2514474" indent="-228589" algn="l" defTabSz="914354" rtl="0" eaLnBrk="1" latinLnBrk="0" hangingPunct="1">
         <a:lnSpc>
           <a:spcPct val="90000"/>
         </a:lnSpc>
@@ -2809,7 +2790,7 @@
           <a:cs typeface="+mn-cs"/>
         </a:defRPr>
       </a:lvl6pPr>
-      <a:lvl7pPr marL="2971800" indent="-228600" algn="l" defTabSz="914400" rtl="0" eaLnBrk="1" latinLnBrk="0" hangingPunct="1">
+      <a:lvl7pPr marL="2971652" indent="-228589" algn="l" defTabSz="914354" rtl="0" eaLnBrk="1" latinLnBrk="0" hangingPunct="1">
         <a:lnSpc>
           <a:spcPct val="90000"/>
         </a:lnSpc>
@@ -2827,7 +2808,7 @@
           <a:cs typeface="+mn-cs"/>
         </a:defRPr>
       </a:lvl7pPr>
-      <a:lvl8pPr marL="3429000" indent="-228600" algn="l" defTabSz="914400" rtl="0" eaLnBrk="1" latinLnBrk="0" hangingPunct="1">
+      <a:lvl8pPr marL="3428829" indent="-228589" algn="l" defTabSz="914354" rtl="0" eaLnBrk="1" latinLnBrk="0" hangingPunct="1">
         <a:lnSpc>
           <a:spcPct val="90000"/>
         </a:lnSpc>
@@ -2845,7 +2826,7 @@
           <a:cs typeface="+mn-cs"/>
         </a:defRPr>
       </a:lvl8pPr>
-      <a:lvl9pPr marL="3886200" indent="-228600" algn="l" defTabSz="914400" rtl="0" eaLnBrk="1" latinLnBrk="0" hangingPunct="1">
+      <a:lvl9pPr marL="3886006" indent="-228589" algn="l" defTabSz="914354" rtl="0" eaLnBrk="1" latinLnBrk="0" hangingPunct="1">
         <a:lnSpc>
           <a:spcPct val="90000"/>
         </a:lnSpc>
@@ -2868,7 +2849,7 @@
       <a:defPPr>
         <a:defRPr lang="en-US"/>
       </a:defPPr>
-      <a:lvl1pPr marL="0" algn="l" defTabSz="914400" rtl="0" eaLnBrk="1" latinLnBrk="0" hangingPunct="1">
+      <a:lvl1pPr marL="0" algn="l" defTabSz="914354" rtl="0" eaLnBrk="1" latinLnBrk="0" hangingPunct="1">
         <a:defRPr sz="1800" kern="1200">
           <a:solidFill>
             <a:schemeClr val="tx1"/>
@@ -2878,7 +2859,7 @@
           <a:cs typeface="+mn-cs"/>
         </a:defRPr>
       </a:lvl1pPr>
-      <a:lvl2pPr marL="457200" algn="l" defTabSz="914400" rtl="0" eaLnBrk="1" latinLnBrk="0" hangingPunct="1">
+      <a:lvl2pPr marL="457178" algn="l" defTabSz="914354" rtl="0" eaLnBrk="1" latinLnBrk="0" hangingPunct="1">
         <a:defRPr sz="1800" kern="1200">
           <a:solidFill>
             <a:schemeClr val="tx1"/>
@@ -2888,7 +2869,7 @@
           <a:cs typeface="+mn-cs"/>
         </a:defRPr>
       </a:lvl2pPr>
-      <a:lvl3pPr marL="914400" algn="l" defTabSz="914400" rtl="0" eaLnBrk="1" latinLnBrk="0" hangingPunct="1">
+      <a:lvl3pPr marL="914354" algn="l" defTabSz="914354" rtl="0" eaLnBrk="1" latinLnBrk="0" hangingPunct="1">
         <a:defRPr sz="1800" kern="1200">
           <a:solidFill>
             <a:schemeClr val="tx1"/>
@@ -2898,7 +2879,7 @@
           <a:cs typeface="+mn-cs"/>
         </a:defRPr>
       </a:lvl3pPr>
-      <a:lvl4pPr marL="1371600" algn="l" defTabSz="914400" rtl="0" eaLnBrk="1" latinLnBrk="0" hangingPunct="1">
+      <a:lvl4pPr marL="1371532" algn="l" defTabSz="914354" rtl="0" eaLnBrk="1" latinLnBrk="0" hangingPunct="1">
         <a:defRPr sz="1800" kern="1200">
           <a:solidFill>
             <a:schemeClr val="tx1"/>
@@ -2908,7 +2889,7 @@
           <a:cs typeface="+mn-cs"/>
         </a:defRPr>
       </a:lvl4pPr>
-      <a:lvl5pPr marL="1828800" algn="l" defTabSz="914400" rtl="0" eaLnBrk="1" latinLnBrk="0" hangingPunct="1">
+      <a:lvl5pPr marL="1828709" algn="l" defTabSz="914354" rtl="0" eaLnBrk="1" latinLnBrk="0" hangingPunct="1">
         <a:defRPr sz="1800" kern="1200">
           <a:solidFill>
             <a:schemeClr val="tx1"/>
@@ -2918,7 +2899,7 @@
           <a:cs typeface="+mn-cs"/>
         </a:defRPr>
       </a:lvl5pPr>
-      <a:lvl6pPr marL="2286000" algn="l" defTabSz="914400" rtl="0" eaLnBrk="1" latinLnBrk="0" hangingPunct="1">
+      <a:lvl6pPr marL="2285886" algn="l" defTabSz="914354" rtl="0" eaLnBrk="1" latinLnBrk="0" hangingPunct="1">
         <a:defRPr sz="1800" kern="1200">
           <a:solidFill>
             <a:schemeClr val="tx1"/>
@@ -2928,7 +2909,7 @@
           <a:cs typeface="+mn-cs"/>
         </a:defRPr>
       </a:lvl6pPr>
-      <a:lvl7pPr marL="2743200" algn="l" defTabSz="914400" rtl="0" eaLnBrk="1" latinLnBrk="0" hangingPunct="1">
+      <a:lvl7pPr marL="2743062" algn="l" defTabSz="914354" rtl="0" eaLnBrk="1" latinLnBrk="0" hangingPunct="1">
         <a:defRPr sz="1800" kern="1200">
           <a:solidFill>
             <a:schemeClr val="tx1"/>
@@ -2938,7 +2919,7 @@
           <a:cs typeface="+mn-cs"/>
         </a:defRPr>
       </a:lvl7pPr>
-      <a:lvl8pPr marL="3200400" algn="l" defTabSz="914400" rtl="0" eaLnBrk="1" latinLnBrk="0" hangingPunct="1">
+      <a:lvl8pPr marL="3200240" algn="l" defTabSz="914354" rtl="0" eaLnBrk="1" latinLnBrk="0" hangingPunct="1">
         <a:defRPr sz="1800" kern="1200">
           <a:solidFill>
             <a:schemeClr val="tx1"/>
@@ -2948,7 +2929,7 @@
           <a:cs typeface="+mn-cs"/>
         </a:defRPr>
       </a:lvl8pPr>
-      <a:lvl9pPr marL="3657600" algn="l" defTabSz="914400" rtl="0" eaLnBrk="1" latinLnBrk="0" hangingPunct="1">
+      <a:lvl9pPr marL="3657418" algn="l" defTabSz="914354" rtl="0" eaLnBrk="1" latinLnBrk="0" hangingPunct="1">
         <a:defRPr sz="1800" kern="1200">
           <a:solidFill>
             <a:schemeClr val="tx1"/>
@@ -3002,6 +2983,149 @@
         </p:blipFill>
         <p:spPr>
           <a:xfrm>
+            <a:off x="0" y="0"/>
+            <a:ext cx="12192000" cy="6858000"/>
+          </a:xfrm>
+          <a:prstGeom prst="rect">
+            <a:avLst/>
+          </a:prstGeom>
+        </p:spPr>
+      </p:pic>
+      <p:sp>
+        <p:nvSpPr>
+          <p:cNvPr id="6" name="TextBox 5"/>
+          <p:cNvSpPr txBox="1"/>
+          <p:nvPr/>
+        </p:nvSpPr>
+        <p:spPr>
+          <a:xfrm>
+            <a:off x="1139491" y="2180025"/>
+            <a:ext cx="8853996" cy="923330"/>
+          </a:xfrm>
+          <a:prstGeom prst="rect">
+            <a:avLst/>
+          </a:prstGeom>
+          <a:noFill/>
+          <a:effectLst>
+            <a:outerShdw blurRad="50800" dist="38100" dir="2700000" algn="tl" rotWithShape="0">
+              <a:prstClr val="black">
+                <a:alpha val="40000"/>
+              </a:prstClr>
+            </a:outerShdw>
+          </a:effectLst>
+        </p:spPr>
+        <p:txBody>
+          <a:bodyPr wrap="square" rtlCol="0">
+            <a:spAutoFit/>
+          </a:bodyPr>
+          <a:lstStyle/>
+          <a:p>
+            <a:r>
+              <a:rPr lang="en-US" sz="5400" dirty="0">
+                <a:solidFill>
+                  <a:schemeClr val="bg1"/>
+                </a:solidFill>
+              </a:rPr>
+              <a:t>Platform Components</a:t>
+            </a:r>
+            <a:endParaRPr lang="en-US" sz="6600" dirty="0">
+              <a:solidFill>
+                <a:schemeClr val="bg1"/>
+              </a:solidFill>
+            </a:endParaRPr>
+          </a:p>
+        </p:txBody>
+      </p:sp>
+      <p:sp>
+        <p:nvSpPr>
+          <p:cNvPr id="7" name="TextBox 6"/>
+          <p:cNvSpPr txBox="1"/>
+          <p:nvPr/>
+        </p:nvSpPr>
+        <p:spPr>
+          <a:xfrm>
+            <a:off x="506029" y="230193"/>
+            <a:ext cx="6569476" cy="584775"/>
+          </a:xfrm>
+          <a:prstGeom prst="rect">
+            <a:avLst/>
+          </a:prstGeom>
+          <a:noFill/>
+        </p:spPr>
+        <p:txBody>
+          <a:bodyPr wrap="square" rtlCol="0">
+            <a:spAutoFit/>
+          </a:bodyPr>
+          <a:lstStyle/>
+          <a:p>
+            <a:r>
+              <a:rPr lang="en-US" sz="3200" dirty="0" err="1">
+                <a:solidFill>
+                  <a:schemeClr val="bg1"/>
+                </a:solidFill>
+              </a:rPr>
+              <a:t>DynThings</a:t>
+            </a:r>
+            <a:endParaRPr lang="en-US" sz="4000" dirty="0">
+              <a:solidFill>
+                <a:schemeClr val="bg1"/>
+              </a:solidFill>
+            </a:endParaRPr>
+          </a:p>
+        </p:txBody>
+      </p:sp>
+    </p:spTree>
+    <p:extLst>
+      <p:ext uri="{BB962C8B-B14F-4D97-AF65-F5344CB8AC3E}">
+        <p14:creationId xmlns:p14="http://schemas.microsoft.com/office/powerpoint/2010/main" val="2281943611"/>
+      </p:ext>
+    </p:extLst>
+  </p:cSld>
+  <p:clrMapOvr>
+    <a:masterClrMapping/>
+  </p:clrMapOvr>
+</p:sld>
+</file>
+
+<file path=ppt/slides/slide2.xml><?xml version="1.0" encoding="utf-8"?>
+<p:sld xmlns:a="http://schemas.openxmlformats.org/drawingml/2006/main" xmlns:r="http://schemas.openxmlformats.org/officeDocument/2006/relationships" xmlns:p="http://schemas.openxmlformats.org/presentationml/2006/main">
+  <p:cSld>
+    <p:spTree>
+      <p:nvGrpSpPr>
+        <p:cNvPr id="1" name=""/>
+        <p:cNvGrpSpPr/>
+        <p:nvPr/>
+      </p:nvGrpSpPr>
+      <p:grpSpPr>
+        <a:xfrm>
+          <a:off x="0" y="0"/>
+          <a:ext cx="0" cy="0"/>
+          <a:chOff x="0" y="0"/>
+          <a:chExt cx="0" cy="0"/>
+        </a:xfrm>
+      </p:grpSpPr>
+      <p:pic>
+        <p:nvPicPr>
+          <p:cNvPr id="4" name="Picture 3"/>
+          <p:cNvPicPr>
+            <a:picLocks noChangeAspect="1"/>
+          </p:cNvPicPr>
+          <p:nvPr/>
+        </p:nvPicPr>
+        <p:blipFill>
+          <a:blip r:embed="rId2">
+            <a:extLst>
+              <a:ext uri="{28A0092B-C50C-407E-A947-70E740481C1C}">
+                <a14:useLocalDpi xmlns:a14="http://schemas.microsoft.com/office/drawing/2010/main" val="0"/>
+              </a:ext>
+            </a:extLst>
+          </a:blip>
+          <a:stretch>
+            <a:fillRect/>
+          </a:stretch>
+        </p:blipFill>
+        <p:spPr>
+          <a:xfrm>
             <a:off x="-8717082" y="-1"/>
             <a:ext cx="17738965" cy="13495849"/>
           </a:xfrm>
@@ -3018,7 +3142,7 @@
         </p:nvSpPr>
         <p:spPr>
           <a:xfrm>
-            <a:off x="9029700" y="0"/>
+            <a:off x="9029702" y="0"/>
             <a:ext cx="3162300" cy="6858000"/>
           </a:xfrm>
           <a:prstGeom prst="rect">
@@ -3046,7 +3170,7 @@
           <a:lstStyle/>
           <a:p>
             <a:pPr algn="ctr"/>
-            <a:endParaRPr lang="en-US"/>
+            <a:endParaRPr lang="en-US" dirty="0"/>
           </a:p>
         </p:txBody>
       </p:sp>
@@ -3170,6 +3294,609 @@
           </a:p>
         </p:txBody>
       </p:sp>
+      <p:graphicFrame>
+        <p:nvGraphicFramePr>
+          <p:cNvPr id="3" name="Table 2"/>
+          <p:cNvGraphicFramePr>
+            <a:graphicFrameLocks noGrp="1"/>
+          </p:cNvGraphicFramePr>
+          <p:nvPr>
+            <p:extLst>
+              <p:ext uri="{D42A27DB-BD31-4B8C-83A1-F6EECF244321}">
+                <p14:modId xmlns:p14="http://schemas.microsoft.com/office/powerpoint/2010/main" val="2397387492"/>
+              </p:ext>
+            </p:extLst>
+          </p:nvPr>
+        </p:nvGraphicFramePr>
+        <p:xfrm>
+          <a:off x="9029702" y="1"/>
+          <a:ext cx="3162300" cy="7519182"/>
+        </p:xfrm>
+        <a:graphic>
+          <a:graphicData uri="http://schemas.openxmlformats.org/drawingml/2006/table">
+            <a:tbl>
+              <a:tblPr firstRow="1" bandRow="1">
+                <a:tableStyleId>{5C22544A-7EE6-4342-B048-85BDC9FD1C3A}</a:tableStyleId>
+              </a:tblPr>
+              <a:tblGrid>
+                <a:gridCol w="457200">
+                  <a:extLst>
+                    <a:ext uri="{9D8B030D-6E8A-4147-A177-3AD203B41FA5}">
+                      <a16:colId xmlns:a16="http://schemas.microsoft.com/office/drawing/2014/main" val="1448596521"/>
+                    </a:ext>
+                  </a:extLst>
+                </a:gridCol>
+                <a:gridCol w="2705100">
+                  <a:extLst>
+                    <a:ext uri="{9D8B030D-6E8A-4147-A177-3AD203B41FA5}">
+                      <a16:colId xmlns:a16="http://schemas.microsoft.com/office/drawing/2014/main" val="3174182021"/>
+                    </a:ext>
+                  </a:extLst>
+                </a:gridCol>
+              </a:tblGrid>
+              <a:tr h="369277">
+                <a:tc>
+                  <a:txBody>
+                    <a:bodyPr/>
+                    <a:lstStyle/>
+                    <a:p>
+                      <a:r>
+                        <a:rPr lang="en-US" sz="1500" dirty="0"/>
+                        <a:t>#</a:t>
+                      </a:r>
+                    </a:p>
+                  </a:txBody>
+                  <a:tcPr/>
+                </a:tc>
+                <a:tc>
+                  <a:txBody>
+                    <a:bodyPr/>
+                    <a:lstStyle/>
+                    <a:p>
+                      <a:r>
+                        <a:rPr lang="en-US" sz="1500" dirty="0"/>
+                        <a:t>Description</a:t>
+                      </a:r>
+                    </a:p>
+                  </a:txBody>
+                  <a:tcPr/>
+                </a:tc>
+                <a:extLst>
+                  <a:ext uri="{0D108BD9-81ED-4DB2-BD59-A6C34878D82A}">
+                    <a16:rowId xmlns:a16="http://schemas.microsoft.com/office/drawing/2014/main" val="221348968"/>
+                  </a:ext>
+                </a:extLst>
+              </a:tr>
+              <a:tr h="369277">
+                <a:tc>
+                  <a:txBody>
+                    <a:bodyPr/>
+                    <a:lstStyle/>
+                    <a:p>
+                      <a:r>
+                        <a:rPr lang="en-US" sz="1500" dirty="0"/>
+                        <a:t>1</a:t>
+                      </a:r>
+                    </a:p>
+                  </a:txBody>
+                  <a:tcPr/>
+                </a:tc>
+                <a:tc>
+                  <a:txBody>
+                    <a:bodyPr/>
+                    <a:lstStyle/>
+                    <a:p>
+                      <a:r>
+                        <a:rPr lang="en-US" sz="1500" dirty="0" err="1"/>
+                        <a:t>EndPoints</a:t>
+                      </a:r>
+                      <a:r>
+                        <a:rPr lang="en-US" sz="1500" dirty="0"/>
+                        <a:t> (Sensors &amp; Actuators)</a:t>
+                      </a:r>
+                    </a:p>
+                  </a:txBody>
+                  <a:tcPr/>
+                </a:tc>
+                <a:extLst>
+                  <a:ext uri="{0D108BD9-81ED-4DB2-BD59-A6C34878D82A}">
+                    <a16:rowId xmlns:a16="http://schemas.microsoft.com/office/drawing/2014/main" val="3306315474"/>
+                  </a:ext>
+                </a:extLst>
+              </a:tr>
+              <a:tr h="548640">
+                <a:tc>
+                  <a:txBody>
+                    <a:bodyPr/>
+                    <a:lstStyle/>
+                    <a:p>
+                      <a:r>
+                        <a:rPr lang="en-US" sz="1500" dirty="0"/>
+                        <a:t>2</a:t>
+                      </a:r>
+                    </a:p>
+                  </a:txBody>
+                  <a:tcPr/>
+                </a:tc>
+                <a:tc>
+                  <a:txBody>
+                    <a:bodyPr/>
+                    <a:lstStyle/>
+                    <a:p>
+                      <a:r>
+                        <a:rPr lang="en-US" sz="1500" dirty="0"/>
+                        <a:t>Devices (single device per building)</a:t>
+                      </a:r>
+                    </a:p>
+                  </a:txBody>
+                  <a:tcPr/>
+                </a:tc>
+                <a:extLst>
+                  <a:ext uri="{0D108BD9-81ED-4DB2-BD59-A6C34878D82A}">
+                    <a16:rowId xmlns:a16="http://schemas.microsoft.com/office/drawing/2014/main" val="3585358115"/>
+                  </a:ext>
+                </a:extLst>
+              </a:tr>
+              <a:tr h="369277">
+                <a:tc>
+                  <a:txBody>
+                    <a:bodyPr/>
+                    <a:lstStyle/>
+                    <a:p>
+                      <a:r>
+                        <a:rPr lang="en-US" sz="1500" dirty="0"/>
+                        <a:t>3</a:t>
+                      </a:r>
+                    </a:p>
+                  </a:txBody>
+                  <a:tcPr/>
+                </a:tc>
+                <a:tc>
+                  <a:txBody>
+                    <a:bodyPr/>
+                    <a:lstStyle/>
+                    <a:p>
+                      <a:r>
+                        <a:rPr lang="en-US" sz="1500" dirty="0"/>
+                        <a:t>Sensors and Devices</a:t>
+                      </a:r>
+                    </a:p>
+                  </a:txBody>
+                  <a:tcPr/>
+                </a:tc>
+                <a:extLst>
+                  <a:ext uri="{0D108BD9-81ED-4DB2-BD59-A6C34878D82A}">
+                    <a16:rowId xmlns:a16="http://schemas.microsoft.com/office/drawing/2014/main" val="3706104774"/>
+                  </a:ext>
+                </a:extLst>
+              </a:tr>
+              <a:tr h="548640">
+                <a:tc>
+                  <a:txBody>
+                    <a:bodyPr/>
+                    <a:lstStyle/>
+                    <a:p>
+                      <a:r>
+                        <a:rPr lang="en-US" sz="1500" dirty="0"/>
+                        <a:t>4</a:t>
+                      </a:r>
+                    </a:p>
+                  </a:txBody>
+                  <a:tcPr/>
+                </a:tc>
+                <a:tc>
+                  <a:txBody>
+                    <a:bodyPr/>
+                    <a:lstStyle/>
+                    <a:p>
+                      <a:r>
+                        <a:rPr lang="en-US" sz="1500" dirty="0"/>
+                        <a:t>API Endpoint to support</a:t>
+                      </a:r>
+                      <a:r>
+                        <a:rPr lang="en-US" sz="1500" baseline="0" dirty="0"/>
+                        <a:t> 3</a:t>
+                      </a:r>
+                      <a:r>
+                        <a:rPr lang="en-US" sz="1500" baseline="30000" dirty="0"/>
+                        <a:t>rd</a:t>
+                      </a:r>
+                      <a:r>
+                        <a:rPr lang="en-US" sz="1500" baseline="0" dirty="0"/>
+                        <a:t> party applications</a:t>
+                      </a:r>
+                      <a:endParaRPr lang="en-US" sz="1500" dirty="0"/>
+                    </a:p>
+                  </a:txBody>
+                  <a:tcPr/>
+                </a:tc>
+                <a:extLst>
+                  <a:ext uri="{0D108BD9-81ED-4DB2-BD59-A6C34878D82A}">
+                    <a16:rowId xmlns:a16="http://schemas.microsoft.com/office/drawing/2014/main" val="2336141026"/>
+                  </a:ext>
+                </a:extLst>
+              </a:tr>
+              <a:tr h="369277">
+                <a:tc>
+                  <a:txBody>
+                    <a:bodyPr/>
+                    <a:lstStyle/>
+                    <a:p>
+                      <a:r>
+                        <a:rPr lang="en-US" sz="1500" dirty="0"/>
+                        <a:t>5</a:t>
+                      </a:r>
+                    </a:p>
+                  </a:txBody>
+                  <a:tcPr/>
+                </a:tc>
+                <a:tc>
+                  <a:txBody>
+                    <a:bodyPr/>
+                    <a:lstStyle/>
+                    <a:p>
+                      <a:r>
+                        <a:rPr lang="en-US" sz="1500" dirty="0"/>
+                        <a:t>Database (Microsoft</a:t>
+                      </a:r>
+                      <a:r>
+                        <a:rPr lang="en-US" sz="1500" baseline="0" dirty="0"/>
+                        <a:t> SQL Server</a:t>
+                      </a:r>
+                      <a:r>
+                        <a:rPr lang="en-US" sz="1500" dirty="0"/>
+                        <a:t>)</a:t>
+                      </a:r>
+                    </a:p>
+                  </a:txBody>
+                  <a:tcPr/>
+                </a:tc>
+                <a:extLst>
+                  <a:ext uri="{0D108BD9-81ED-4DB2-BD59-A6C34878D82A}">
+                    <a16:rowId xmlns:a16="http://schemas.microsoft.com/office/drawing/2014/main" val="127018437"/>
+                  </a:ext>
+                </a:extLst>
+              </a:tr>
+              <a:tr h="777240">
+                <a:tc>
+                  <a:txBody>
+                    <a:bodyPr/>
+                    <a:lstStyle/>
+                    <a:p>
+                      <a:r>
+                        <a:rPr lang="en-US" sz="1500" dirty="0"/>
+                        <a:t>6</a:t>
+                      </a:r>
+                    </a:p>
+                  </a:txBody>
+                  <a:tcPr/>
+                </a:tc>
+                <a:tc>
+                  <a:txBody>
+                    <a:bodyPr/>
+                    <a:lstStyle/>
+                    <a:p>
+                      <a:r>
+                        <a:rPr lang="en-US" sz="1500" dirty="0"/>
+                        <a:t>Agent Service to Sync</a:t>
+                      </a:r>
+                      <a:r>
+                        <a:rPr lang="en-US" sz="1500" baseline="0" dirty="0"/>
+                        <a:t> </a:t>
+                      </a:r>
+                      <a:r>
+                        <a:rPr lang="en-US" sz="1500" baseline="0" dirty="0" err="1"/>
+                        <a:t>DynThings</a:t>
+                      </a:r>
+                      <a:r>
+                        <a:rPr lang="en-US" sz="1500" baseline="0" dirty="0"/>
+                        <a:t> Users with the enterprise Active Directory</a:t>
+                      </a:r>
+                      <a:endParaRPr lang="en-US" sz="1500" dirty="0"/>
+                    </a:p>
+                  </a:txBody>
+                  <a:tcPr/>
+                </a:tc>
+                <a:extLst>
+                  <a:ext uri="{0D108BD9-81ED-4DB2-BD59-A6C34878D82A}">
+                    <a16:rowId xmlns:a16="http://schemas.microsoft.com/office/drawing/2014/main" val="1895855448"/>
+                  </a:ext>
+                </a:extLst>
+              </a:tr>
+              <a:tr h="369277">
+                <a:tc>
+                  <a:txBody>
+                    <a:bodyPr/>
+                    <a:lstStyle/>
+                    <a:p>
+                      <a:r>
+                        <a:rPr lang="en-US" sz="1500" dirty="0"/>
+                        <a:t>7</a:t>
+                      </a:r>
+                    </a:p>
+                  </a:txBody>
+                  <a:tcPr/>
+                </a:tc>
+                <a:tc>
+                  <a:txBody>
+                    <a:bodyPr/>
+                    <a:lstStyle/>
+                    <a:p>
+                      <a:r>
+                        <a:rPr lang="en-US" sz="1500" baseline="0" dirty="0"/>
+                        <a:t>The enterprise Active Directory</a:t>
+                      </a:r>
+                      <a:endParaRPr lang="en-US" sz="1500" dirty="0"/>
+                    </a:p>
+                  </a:txBody>
+                  <a:tcPr/>
+                </a:tc>
+                <a:extLst>
+                  <a:ext uri="{0D108BD9-81ED-4DB2-BD59-A6C34878D82A}">
+                    <a16:rowId xmlns:a16="http://schemas.microsoft.com/office/drawing/2014/main" val="1708581269"/>
+                  </a:ext>
+                </a:extLst>
+              </a:tr>
+              <a:tr h="369277">
+                <a:tc>
+                  <a:txBody>
+                    <a:bodyPr/>
+                    <a:lstStyle/>
+                    <a:p>
+                      <a:r>
+                        <a:rPr lang="en-US" sz="1500" dirty="0"/>
+                        <a:t>8</a:t>
+                      </a:r>
+                    </a:p>
+                  </a:txBody>
+                  <a:tcPr/>
+                </a:tc>
+                <a:tc>
+                  <a:txBody>
+                    <a:bodyPr/>
+                    <a:lstStyle/>
+                    <a:p>
+                      <a:r>
+                        <a:rPr lang="en-US" sz="1500" dirty="0" err="1"/>
+                        <a:t>DynThings</a:t>
+                      </a:r>
+                      <a:r>
+                        <a:rPr lang="en-US" sz="1500" baseline="0" dirty="0"/>
+                        <a:t> Main Application</a:t>
+                      </a:r>
+                      <a:endParaRPr lang="en-US" sz="1500" dirty="0"/>
+                    </a:p>
+                  </a:txBody>
+                  <a:tcPr/>
+                </a:tc>
+                <a:extLst>
+                  <a:ext uri="{0D108BD9-81ED-4DB2-BD59-A6C34878D82A}">
+                    <a16:rowId xmlns:a16="http://schemas.microsoft.com/office/drawing/2014/main" val="1056879409"/>
+                  </a:ext>
+                </a:extLst>
+              </a:tr>
+              <a:tr h="548640">
+                <a:tc>
+                  <a:txBody>
+                    <a:bodyPr/>
+                    <a:lstStyle/>
+                    <a:p>
+                      <a:r>
+                        <a:rPr lang="en-US" sz="1500" dirty="0"/>
+                        <a:t>9</a:t>
+                      </a:r>
+                    </a:p>
+                  </a:txBody>
+                  <a:tcPr/>
+                </a:tc>
+                <a:tc>
+                  <a:txBody>
+                    <a:bodyPr/>
+                    <a:lstStyle/>
+                    <a:p>
+                      <a:r>
+                        <a:rPr lang="en-US" sz="1500" dirty="0"/>
+                        <a:t>Client</a:t>
+                      </a:r>
+                      <a:r>
+                        <a:rPr lang="en-US" sz="1500" baseline="0" dirty="0"/>
+                        <a:t> Application designed for Monitor and Control rooms</a:t>
+                      </a:r>
+                      <a:endParaRPr lang="en-US" sz="1500" dirty="0"/>
+                    </a:p>
+                  </a:txBody>
+                  <a:tcPr/>
+                </a:tc>
+                <a:extLst>
+                  <a:ext uri="{0D108BD9-81ED-4DB2-BD59-A6C34878D82A}">
+                    <a16:rowId xmlns:a16="http://schemas.microsoft.com/office/drawing/2014/main" val="1101019906"/>
+                  </a:ext>
+                </a:extLst>
+              </a:tr>
+              <a:tr h="777240">
+                <a:tc>
+                  <a:txBody>
+                    <a:bodyPr/>
+                    <a:lstStyle/>
+                    <a:p>
+                      <a:r>
+                        <a:rPr lang="en-US" sz="1500" dirty="0"/>
+                        <a:t>10</a:t>
+                      </a:r>
+                    </a:p>
+                  </a:txBody>
+                  <a:tcPr/>
+                </a:tc>
+                <a:tc>
+                  <a:txBody>
+                    <a:bodyPr/>
+                    <a:lstStyle/>
+                    <a:p>
+                      <a:r>
+                        <a:rPr lang="en-US" sz="1500" dirty="0"/>
+                        <a:t>On site Technician</a:t>
+                      </a:r>
+                      <a:r>
+                        <a:rPr lang="en-US" sz="1500" baseline="0" dirty="0"/>
+                        <a:t> can access the platform using the Mobile App.</a:t>
+                      </a:r>
+                      <a:endParaRPr lang="en-US" sz="1500" dirty="0"/>
+                    </a:p>
+                  </a:txBody>
+                  <a:tcPr/>
+                </a:tc>
+                <a:extLst>
+                  <a:ext uri="{0D108BD9-81ED-4DB2-BD59-A6C34878D82A}">
+                    <a16:rowId xmlns:a16="http://schemas.microsoft.com/office/drawing/2014/main" val="2316165823"/>
+                  </a:ext>
+                </a:extLst>
+              </a:tr>
+              <a:tr h="777240">
+                <a:tc>
+                  <a:txBody>
+                    <a:bodyPr/>
+                    <a:lstStyle/>
+                    <a:p>
+                      <a:r>
+                        <a:rPr lang="en-US" sz="1500" dirty="0"/>
+                        <a:t>11</a:t>
+                      </a:r>
+                    </a:p>
+                  </a:txBody>
+                  <a:tcPr/>
+                </a:tc>
+                <a:tc>
+                  <a:txBody>
+                    <a:bodyPr/>
+                    <a:lstStyle/>
+                    <a:p>
+                      <a:pPr marL="0" marR="0" lvl="0" indent="0" algn="l" defTabSz="914400" rtl="0" eaLnBrk="1" fontAlgn="auto" latinLnBrk="0" hangingPunct="1">
+                        <a:lnSpc>
+                          <a:spcPct val="100000"/>
+                        </a:lnSpc>
+                        <a:spcBef>
+                          <a:spcPts val="0"/>
+                        </a:spcBef>
+                        <a:spcAft>
+                          <a:spcPts val="0"/>
+                        </a:spcAft>
+                        <a:buClrTx/>
+                        <a:buSzTx/>
+                        <a:buFontTx/>
+                        <a:buNone/>
+                        <a:tabLst/>
+                        <a:defRPr/>
+                      </a:pPr>
+                      <a:r>
+                        <a:rPr lang="en-US" sz="1500" dirty="0"/>
+                        <a:t>End-Users</a:t>
+                      </a:r>
+                      <a:r>
+                        <a:rPr lang="en-US" sz="1500" baseline="0" dirty="0"/>
+                        <a:t> can access the platform using the Mobile App.</a:t>
+                      </a:r>
+                      <a:endParaRPr lang="en-US" sz="1500" dirty="0"/>
+                    </a:p>
+                    <a:p>
+                      <a:endParaRPr lang="en-US" sz="1500" dirty="0"/>
+                    </a:p>
+                  </a:txBody>
+                  <a:tcPr/>
+                </a:tc>
+                <a:extLst>
+                  <a:ext uri="{0D108BD9-81ED-4DB2-BD59-A6C34878D82A}">
+                    <a16:rowId xmlns:a16="http://schemas.microsoft.com/office/drawing/2014/main" val="1260399645"/>
+                  </a:ext>
+                </a:extLst>
+              </a:tr>
+              <a:tr h="777240">
+                <a:tc>
+                  <a:txBody>
+                    <a:bodyPr/>
+                    <a:lstStyle/>
+                    <a:p>
+                      <a:r>
+                        <a:rPr lang="en-US" sz="1500" dirty="0"/>
+                        <a:t>12</a:t>
+                      </a:r>
+                    </a:p>
+                  </a:txBody>
+                  <a:tcPr/>
+                </a:tc>
+                <a:tc>
+                  <a:txBody>
+                    <a:bodyPr/>
+                    <a:lstStyle/>
+                    <a:p>
+                      <a:r>
+                        <a:rPr lang="en-US" sz="1500" dirty="0"/>
+                        <a:t>3</a:t>
+                      </a:r>
+                      <a:r>
+                        <a:rPr lang="en-US" sz="1500" baseline="30000" dirty="0"/>
+                        <a:t>rd</a:t>
+                      </a:r>
+                      <a:r>
+                        <a:rPr lang="en-US" sz="1500" dirty="0"/>
+                        <a:t> party applications</a:t>
+                      </a:r>
+                      <a:r>
+                        <a:rPr lang="en-US" sz="1500" baseline="0" dirty="0"/>
+                        <a:t> can communicate using API Endpoint</a:t>
+                      </a:r>
+                      <a:endParaRPr lang="en-US" sz="1500" dirty="0"/>
+                    </a:p>
+                  </a:txBody>
+                  <a:tcPr/>
+                </a:tc>
+                <a:extLst>
+                  <a:ext uri="{0D108BD9-81ED-4DB2-BD59-A6C34878D82A}">
+                    <a16:rowId xmlns:a16="http://schemas.microsoft.com/office/drawing/2014/main" val="860857388"/>
+                  </a:ext>
+                </a:extLst>
+              </a:tr>
+              <a:tr h="548640">
+                <a:tc>
+                  <a:txBody>
+                    <a:bodyPr/>
+                    <a:lstStyle/>
+                    <a:p>
+                      <a:r>
+                        <a:rPr lang="en-US" sz="1500" dirty="0"/>
+                        <a:t>13</a:t>
+                      </a:r>
+                    </a:p>
+                  </a:txBody>
+                  <a:tcPr/>
+                </a:tc>
+                <a:tc>
+                  <a:txBody>
+                    <a:bodyPr/>
+                    <a:lstStyle/>
+                    <a:p>
+                      <a:r>
+                        <a:rPr lang="en-US" sz="1500" dirty="0"/>
+                        <a:t>SMS Gateway to send and receive IOs</a:t>
+                      </a:r>
+                      <a:r>
+                        <a:rPr lang="en-US" sz="1500" baseline="0" dirty="0"/>
+                        <a:t> using SMS instead of </a:t>
+                      </a:r>
+                      <a:endParaRPr lang="en-US" sz="1500" dirty="0"/>
+                    </a:p>
+                  </a:txBody>
+                  <a:tcPr/>
+                </a:tc>
+                <a:extLst>
+                  <a:ext uri="{0D108BD9-81ED-4DB2-BD59-A6C34878D82A}">
+                    <a16:rowId xmlns:a16="http://schemas.microsoft.com/office/drawing/2014/main" val="1006986802"/>
+                  </a:ext>
+                </a:extLst>
+              </a:tr>
+            </a:tbl>
+          </a:graphicData>
+        </a:graphic>
+      </p:graphicFrame>
     </p:spTree>
     <p:extLst>
       <p:ext uri="{BB962C8B-B14F-4D97-AF65-F5344CB8AC3E}">
@@ -3206,7 +3933,7 @@
                                     <p:cond delay="0"/>
                                   </p:stCondLst>
                                   <p:childTnLst>
-                                    <p:animMotion origin="layout" path="M 1.73472E-18 3.7037E-6 L 0.4875 3.7037E-6 " pathEditMode="relative" rAng="0" ptsTypes="AA">
+                                    <p:animMotion origin="layout" path="M 1.73472E-18 -2.96296E-6 L 0.4875 -2.96296E-6 " pathEditMode="relative" rAng="0" ptsTypes="AA">
                                       <p:cBhvr>
                                         <p:cTn id="6" dur="2000" fill="hold"/>
                                         <p:tgtEl>
@@ -3246,7 +3973,7 @@
                                     <p:cond delay="0"/>
                                   </p:stCondLst>
                                   <p:childTnLst>
-                                    <p:animMotion origin="layout" path="M 0.48438 3.7037E-6 L 0.71406 -0.96436 " pathEditMode="relative" rAng="0" ptsTypes="AA">
+                                    <p:animMotion origin="layout" path="M 0.48438 -2.96296E-6 L 0.71406 -0.96435 " pathEditMode="relative" rAng="0" ptsTypes="AA">
                                       <p:cBhvr>
                                         <p:cTn id="10" dur="2000" fill="hold"/>
                                         <p:tgtEl>
@@ -3257,7 +3984,7 @@
                                           <p:attrName>ppt_y</p:attrName>
                                         </p:attrNameLst>
                                       </p:cBhvr>
-                                      <p:rCtr x="11484" y="-48218"/>
+                                      <p:rCtr x="11476" y="-48218"/>
                                     </p:animMotion>
                                   </p:childTnLst>
                                 </p:cTn>
@@ -3286,7 +4013,7 @@
                                     <p:cond delay="0"/>
                                   </p:stCondLst>
                                   <p:childTnLst>
-                                    <p:animMotion origin="layout" path="M 0.71406 -0.96436 L 0.71523 -0.68426 " pathEditMode="relative" rAng="0" ptsTypes="AA">
+                                    <p:animMotion origin="layout" path="M 0.71406 -0.96435 L 0.71528 -0.68426 " pathEditMode="relative" rAng="0" ptsTypes="AA">
                                       <p:cBhvr>
                                         <p:cTn id="14" dur="2000" fill="hold"/>
                                         <p:tgtEl>
@@ -3326,7 +4053,7 @@
                                     <p:cond delay="0"/>
                                   </p:stCondLst>
                                   <p:childTnLst>
-                                    <p:animMotion origin="layout" path="M 0.71523 -0.68426 L 0.01016 -0.94167 " pathEditMode="relative" rAng="0" ptsTypes="AA">
+                                    <p:animMotion origin="layout" path="M 0.71528 -0.68426 L 0.01024 -0.94166 " pathEditMode="relative" rAng="0" ptsTypes="AA">
                                       <p:cBhvr>
                                         <p:cTn id="18" dur="2000" fill="hold"/>
                                         <p:tgtEl>
@@ -3366,7 +4093,7 @@
                                     <p:cond delay="0"/>
                                   </p:stCondLst>
                                   <p:childTnLst>
-                                    <p:animMotion origin="layout" path="M 0.01016 -0.94167 L 0.12565 -0.55834 " pathEditMode="relative" rAng="0" ptsTypes="AA">
+                                    <p:animMotion origin="layout" path="M 0.01024 -0.94166 L 0.12569 -0.55833 " pathEditMode="relative" rAng="0" ptsTypes="AA">
                                       <p:cBhvr>
                                         <p:cTn id="22" dur="2000" fill="hold"/>
                                         <p:tgtEl>
@@ -3377,7 +4104,7 @@
                                           <p:attrName>ppt_y</p:attrName>
                                         </p:attrNameLst>
                                       </p:cBhvr>
-                                      <p:rCtr x="5768" y="19167"/>
+                                      <p:rCtr x="5764" y="19167"/>
                                     </p:animMotion>
                                   </p:childTnLst>
                                 </p:cTn>
@@ -3406,7 +4133,7 @@
                                     <p:cond delay="0"/>
                                   </p:stCondLst>
                                   <p:childTnLst>
-                                    <p:animMotion origin="layout" path="M 0.12565 -0.55834 L 0.01016 -0.94167 " pathEditMode="relative" rAng="0" ptsTypes="AA">
+                                    <p:animMotion origin="layout" path="M 0.12569 -0.55833 L 0.01024 -0.94166 " pathEditMode="relative" rAng="0" ptsTypes="AA">
                                       <p:cBhvr>
                                         <p:cTn id="26" dur="2000" fill="hold"/>
                                         <p:tgtEl>
@@ -3417,7 +4144,7 @@
                                           <p:attrName>ppt_y</p:attrName>
                                         </p:attrNameLst>
                                       </p:cBhvr>
-                                      <p:rCtr x="-7630" y="-15880"/>
+                                      <p:rCtr x="-5781" y="-19167"/>
                                     </p:animMotion>
                                   </p:childTnLst>
                                 </p:cTn>
@@ -3446,7 +4173,7 @@
                                     <p:cond delay="0"/>
                                   </p:stCondLst>
                                   <p:childTnLst>
-                                    <p:animMotion origin="layout" path="M 0.01016 -0.94167 L 0.59583 -0.94167 " pathEditMode="relative" rAng="0" ptsTypes="AA">
+                                    <p:animMotion origin="layout" path="M 0.01024 -0.94166 L 0.59583 -0.94166 " pathEditMode="relative" rAng="0" ptsTypes="AA">
                                       <p:cBhvr>
                                         <p:cTn id="30" dur="2000" fill="hold"/>
                                         <p:tgtEl>
@@ -3457,7 +4184,7 @@
                                           <p:attrName>ppt_y</p:attrName>
                                         </p:attrNameLst>
                                       </p:cBhvr>
-                                      <p:rCtr x="29219" y="0"/>
+                                      <p:rCtr x="29271" y="0"/>
                                     </p:animMotion>
                                   </p:childTnLst>
                                 </p:cTn>
@@ -3486,7 +4213,7 @@
                                     <p:cond delay="0"/>
                                   </p:stCondLst>
                                   <p:childTnLst>
-                                    <p:animMotion origin="layout" path="M 0.59583 -0.94167 L 0.18984 -0.6875 " pathEditMode="relative" rAng="0" ptsTypes="AA">
+                                    <p:animMotion origin="layout" path="M 0.59583 -0.94166 L 0.18976 -0.6875 " pathEditMode="relative" rAng="0" ptsTypes="AA">
                                       <p:cBhvr>
                                         <p:cTn id="34" dur="2000" fill="hold"/>
                                         <p:tgtEl>
@@ -3497,7 +4224,7 @@
                                           <p:attrName>ppt_y</p:attrName>
                                         </p:attrNameLst>
                                       </p:cBhvr>
-                                      <p:rCtr x="-20299" y="12708"/>
+                                      <p:rCtr x="-20313" y="12708"/>
                                     </p:animMotion>
                                   </p:childTnLst>
                                 </p:cTn>
@@ -3530,6 +4257,668 @@
       </p:par>
     </p:tnLst>
   </p:timing>
+</p:sld>
+</file>
+
+<file path=ppt/slides/slide3.xml><?xml version="1.0" encoding="utf-8"?>
+<p:sld xmlns:a="http://schemas.openxmlformats.org/drawingml/2006/main" xmlns:r="http://schemas.openxmlformats.org/officeDocument/2006/relationships" xmlns:p="http://schemas.openxmlformats.org/presentationml/2006/main">
+  <p:cSld>
+    <p:spTree>
+      <p:nvGrpSpPr>
+        <p:cNvPr id="1" name=""/>
+        <p:cNvGrpSpPr/>
+        <p:nvPr/>
+      </p:nvGrpSpPr>
+      <p:grpSpPr>
+        <a:xfrm>
+          <a:off x="0" y="0"/>
+          <a:ext cx="0" cy="0"/>
+          <a:chOff x="0" y="0"/>
+          <a:chExt cx="0" cy="0"/>
+        </a:xfrm>
+      </p:grpSpPr>
+      <p:pic>
+        <p:nvPicPr>
+          <p:cNvPr id="4" name="Content Placeholder 3"/>
+          <p:cNvPicPr>
+            <a:picLocks noGrp="1" noChangeAspect="1"/>
+          </p:cNvPicPr>
+          <p:nvPr>
+            <p:ph idx="1"/>
+          </p:nvPr>
+        </p:nvPicPr>
+        <p:blipFill>
+          <a:blip r:embed="rId2" cstate="print">
+            <a:extLst>
+              <a:ext uri="{28A0092B-C50C-407E-A947-70E740481C1C}">
+                <a14:useLocalDpi xmlns:a14="http://schemas.microsoft.com/office/drawing/2010/main" val="0"/>
+              </a:ext>
+            </a:extLst>
+          </a:blip>
+          <a:stretch>
+            <a:fillRect/>
+          </a:stretch>
+        </p:blipFill>
+        <p:spPr>
+          <a:xfrm>
+            <a:off x="2" y="0"/>
+            <a:ext cx="9004300" cy="6877712"/>
+          </a:xfrm>
+        </p:spPr>
+      </p:pic>
+      <p:graphicFrame>
+        <p:nvGraphicFramePr>
+          <p:cNvPr id="7" name="Table 6"/>
+          <p:cNvGraphicFramePr>
+            <a:graphicFrameLocks noGrp="1"/>
+          </p:cNvGraphicFramePr>
+          <p:nvPr>
+            <p:extLst>
+              <p:ext uri="{D42A27DB-BD31-4B8C-83A1-F6EECF244321}">
+                <p14:modId xmlns:p14="http://schemas.microsoft.com/office/powerpoint/2010/main" val="4108467560"/>
+              </p:ext>
+            </p:extLst>
+          </p:nvPr>
+        </p:nvGraphicFramePr>
+        <p:xfrm>
+          <a:off x="9029702" y="4"/>
+          <a:ext cx="3162300" cy="7519182"/>
+        </p:xfrm>
+        <a:graphic>
+          <a:graphicData uri="http://schemas.openxmlformats.org/drawingml/2006/table">
+            <a:tbl>
+              <a:tblPr firstRow="1" bandRow="1">
+                <a:tableStyleId>{5C22544A-7EE6-4342-B048-85BDC9FD1C3A}</a:tableStyleId>
+              </a:tblPr>
+              <a:tblGrid>
+                <a:gridCol w="457200">
+                  <a:extLst>
+                    <a:ext uri="{9D8B030D-6E8A-4147-A177-3AD203B41FA5}">
+                      <a16:colId xmlns:a16="http://schemas.microsoft.com/office/drawing/2014/main" val="1448596521"/>
+                    </a:ext>
+                  </a:extLst>
+                </a:gridCol>
+                <a:gridCol w="2705100">
+                  <a:extLst>
+                    <a:ext uri="{9D8B030D-6E8A-4147-A177-3AD203B41FA5}">
+                      <a16:colId xmlns:a16="http://schemas.microsoft.com/office/drawing/2014/main" val="3174182021"/>
+                    </a:ext>
+                  </a:extLst>
+                </a:gridCol>
+              </a:tblGrid>
+              <a:tr h="369277">
+                <a:tc>
+                  <a:txBody>
+                    <a:bodyPr/>
+                    <a:lstStyle/>
+                    <a:p>
+                      <a:r>
+                        <a:rPr lang="en-US" sz="1500" dirty="0"/>
+                        <a:t>#</a:t>
+                      </a:r>
+                    </a:p>
+                  </a:txBody>
+                  <a:tcPr/>
+                </a:tc>
+                <a:tc>
+                  <a:txBody>
+                    <a:bodyPr/>
+                    <a:lstStyle/>
+                    <a:p>
+                      <a:r>
+                        <a:rPr lang="en-US" sz="1500" dirty="0"/>
+                        <a:t>Description</a:t>
+                      </a:r>
+                    </a:p>
+                  </a:txBody>
+                  <a:tcPr/>
+                </a:tc>
+                <a:extLst>
+                  <a:ext uri="{0D108BD9-81ED-4DB2-BD59-A6C34878D82A}">
+                    <a16:rowId xmlns:a16="http://schemas.microsoft.com/office/drawing/2014/main" val="221348968"/>
+                  </a:ext>
+                </a:extLst>
+              </a:tr>
+              <a:tr h="369277">
+                <a:tc>
+                  <a:txBody>
+                    <a:bodyPr/>
+                    <a:lstStyle/>
+                    <a:p>
+                      <a:r>
+                        <a:rPr lang="en-US" sz="1500" dirty="0"/>
+                        <a:t>1</a:t>
+                      </a:r>
+                    </a:p>
+                  </a:txBody>
+                  <a:tcPr/>
+                </a:tc>
+                <a:tc>
+                  <a:txBody>
+                    <a:bodyPr/>
+                    <a:lstStyle/>
+                    <a:p>
+                      <a:r>
+                        <a:rPr lang="en-US" sz="1500" dirty="0" err="1"/>
+                        <a:t>EndPoints</a:t>
+                      </a:r>
+                      <a:r>
+                        <a:rPr lang="en-US" sz="1500" dirty="0"/>
+                        <a:t> (Sensors &amp; Actuators)</a:t>
+                      </a:r>
+                    </a:p>
+                  </a:txBody>
+                  <a:tcPr/>
+                </a:tc>
+                <a:extLst>
+                  <a:ext uri="{0D108BD9-81ED-4DB2-BD59-A6C34878D82A}">
+                    <a16:rowId xmlns:a16="http://schemas.microsoft.com/office/drawing/2014/main" val="3306315474"/>
+                  </a:ext>
+                </a:extLst>
+              </a:tr>
+              <a:tr h="548640">
+                <a:tc>
+                  <a:txBody>
+                    <a:bodyPr/>
+                    <a:lstStyle/>
+                    <a:p>
+                      <a:r>
+                        <a:rPr lang="en-US" sz="1500" dirty="0"/>
+                        <a:t>2</a:t>
+                      </a:r>
+                    </a:p>
+                  </a:txBody>
+                  <a:tcPr/>
+                </a:tc>
+                <a:tc>
+                  <a:txBody>
+                    <a:bodyPr/>
+                    <a:lstStyle/>
+                    <a:p>
+                      <a:r>
+                        <a:rPr lang="en-US" sz="1500" dirty="0"/>
+                        <a:t>Devices (single device per building)</a:t>
+                      </a:r>
+                    </a:p>
+                  </a:txBody>
+                  <a:tcPr/>
+                </a:tc>
+                <a:extLst>
+                  <a:ext uri="{0D108BD9-81ED-4DB2-BD59-A6C34878D82A}">
+                    <a16:rowId xmlns:a16="http://schemas.microsoft.com/office/drawing/2014/main" val="3585358115"/>
+                  </a:ext>
+                </a:extLst>
+              </a:tr>
+              <a:tr h="369277">
+                <a:tc>
+                  <a:txBody>
+                    <a:bodyPr/>
+                    <a:lstStyle/>
+                    <a:p>
+                      <a:r>
+                        <a:rPr lang="en-US" sz="1500" dirty="0"/>
+                        <a:t>3</a:t>
+                      </a:r>
+                    </a:p>
+                  </a:txBody>
+                  <a:tcPr/>
+                </a:tc>
+                <a:tc>
+                  <a:txBody>
+                    <a:bodyPr/>
+                    <a:lstStyle/>
+                    <a:p>
+                      <a:r>
+                        <a:rPr lang="en-US" sz="1500" dirty="0"/>
+                        <a:t>Sensors and Devices</a:t>
+                      </a:r>
+                    </a:p>
+                  </a:txBody>
+                  <a:tcPr/>
+                </a:tc>
+                <a:extLst>
+                  <a:ext uri="{0D108BD9-81ED-4DB2-BD59-A6C34878D82A}">
+                    <a16:rowId xmlns:a16="http://schemas.microsoft.com/office/drawing/2014/main" val="3706104774"/>
+                  </a:ext>
+                </a:extLst>
+              </a:tr>
+              <a:tr h="548640">
+                <a:tc>
+                  <a:txBody>
+                    <a:bodyPr/>
+                    <a:lstStyle/>
+                    <a:p>
+                      <a:r>
+                        <a:rPr lang="en-US" sz="1500" dirty="0"/>
+                        <a:t>4</a:t>
+                      </a:r>
+                    </a:p>
+                  </a:txBody>
+                  <a:tcPr/>
+                </a:tc>
+                <a:tc>
+                  <a:txBody>
+                    <a:bodyPr/>
+                    <a:lstStyle/>
+                    <a:p>
+                      <a:r>
+                        <a:rPr lang="en-US" sz="1500" dirty="0"/>
+                        <a:t>API Endpoint to support</a:t>
+                      </a:r>
+                      <a:r>
+                        <a:rPr lang="en-US" sz="1500" baseline="0" dirty="0"/>
+                        <a:t> 3</a:t>
+                      </a:r>
+                      <a:r>
+                        <a:rPr lang="en-US" sz="1500" baseline="30000" dirty="0"/>
+                        <a:t>rd</a:t>
+                      </a:r>
+                      <a:r>
+                        <a:rPr lang="en-US" sz="1500" baseline="0" dirty="0"/>
+                        <a:t> party applications</a:t>
+                      </a:r>
+                      <a:endParaRPr lang="en-US" sz="1500" dirty="0"/>
+                    </a:p>
+                  </a:txBody>
+                  <a:tcPr/>
+                </a:tc>
+                <a:extLst>
+                  <a:ext uri="{0D108BD9-81ED-4DB2-BD59-A6C34878D82A}">
+                    <a16:rowId xmlns:a16="http://schemas.microsoft.com/office/drawing/2014/main" val="2336141026"/>
+                  </a:ext>
+                </a:extLst>
+              </a:tr>
+              <a:tr h="369277">
+                <a:tc>
+                  <a:txBody>
+                    <a:bodyPr/>
+                    <a:lstStyle/>
+                    <a:p>
+                      <a:r>
+                        <a:rPr lang="en-US" sz="1500" dirty="0"/>
+                        <a:t>5</a:t>
+                      </a:r>
+                    </a:p>
+                  </a:txBody>
+                  <a:tcPr/>
+                </a:tc>
+                <a:tc>
+                  <a:txBody>
+                    <a:bodyPr/>
+                    <a:lstStyle/>
+                    <a:p>
+                      <a:r>
+                        <a:rPr lang="en-US" sz="1500" dirty="0"/>
+                        <a:t>Database (Microsoft</a:t>
+                      </a:r>
+                      <a:r>
+                        <a:rPr lang="en-US" sz="1500" baseline="0" dirty="0"/>
+                        <a:t> SQL Server</a:t>
+                      </a:r>
+                      <a:r>
+                        <a:rPr lang="en-US" sz="1500" dirty="0"/>
+                        <a:t>)</a:t>
+                      </a:r>
+                    </a:p>
+                  </a:txBody>
+                  <a:tcPr/>
+                </a:tc>
+                <a:extLst>
+                  <a:ext uri="{0D108BD9-81ED-4DB2-BD59-A6C34878D82A}">
+                    <a16:rowId xmlns:a16="http://schemas.microsoft.com/office/drawing/2014/main" val="127018437"/>
+                  </a:ext>
+                </a:extLst>
+              </a:tr>
+              <a:tr h="777240">
+                <a:tc>
+                  <a:txBody>
+                    <a:bodyPr/>
+                    <a:lstStyle/>
+                    <a:p>
+                      <a:r>
+                        <a:rPr lang="en-US" sz="1500" dirty="0"/>
+                        <a:t>6</a:t>
+                      </a:r>
+                    </a:p>
+                  </a:txBody>
+                  <a:tcPr/>
+                </a:tc>
+                <a:tc>
+                  <a:txBody>
+                    <a:bodyPr/>
+                    <a:lstStyle/>
+                    <a:p>
+                      <a:r>
+                        <a:rPr lang="en-US" sz="1500" dirty="0"/>
+                        <a:t>Agent Service to Sync</a:t>
+                      </a:r>
+                      <a:r>
+                        <a:rPr lang="en-US" sz="1500" baseline="0" dirty="0"/>
+                        <a:t> </a:t>
+                      </a:r>
+                      <a:r>
+                        <a:rPr lang="en-US" sz="1500" baseline="0" dirty="0" err="1"/>
+                        <a:t>DynThings</a:t>
+                      </a:r>
+                      <a:r>
+                        <a:rPr lang="en-US" sz="1500" baseline="0" dirty="0"/>
+                        <a:t> Users with the enterprise Active Directory</a:t>
+                      </a:r>
+                      <a:endParaRPr lang="en-US" sz="1500" dirty="0"/>
+                    </a:p>
+                  </a:txBody>
+                  <a:tcPr/>
+                </a:tc>
+                <a:extLst>
+                  <a:ext uri="{0D108BD9-81ED-4DB2-BD59-A6C34878D82A}">
+                    <a16:rowId xmlns:a16="http://schemas.microsoft.com/office/drawing/2014/main" val="1895855448"/>
+                  </a:ext>
+                </a:extLst>
+              </a:tr>
+              <a:tr h="369277">
+                <a:tc>
+                  <a:txBody>
+                    <a:bodyPr/>
+                    <a:lstStyle/>
+                    <a:p>
+                      <a:r>
+                        <a:rPr lang="en-US" sz="1500" dirty="0"/>
+                        <a:t>7</a:t>
+                      </a:r>
+                    </a:p>
+                  </a:txBody>
+                  <a:tcPr/>
+                </a:tc>
+                <a:tc>
+                  <a:txBody>
+                    <a:bodyPr/>
+                    <a:lstStyle/>
+                    <a:p>
+                      <a:r>
+                        <a:rPr lang="en-US" sz="1500" baseline="0" dirty="0"/>
+                        <a:t>The enterprise Active Directory</a:t>
+                      </a:r>
+                      <a:endParaRPr lang="en-US" sz="1500" dirty="0"/>
+                    </a:p>
+                  </a:txBody>
+                  <a:tcPr/>
+                </a:tc>
+                <a:extLst>
+                  <a:ext uri="{0D108BD9-81ED-4DB2-BD59-A6C34878D82A}">
+                    <a16:rowId xmlns:a16="http://schemas.microsoft.com/office/drawing/2014/main" val="1708581269"/>
+                  </a:ext>
+                </a:extLst>
+              </a:tr>
+              <a:tr h="369277">
+                <a:tc>
+                  <a:txBody>
+                    <a:bodyPr/>
+                    <a:lstStyle/>
+                    <a:p>
+                      <a:r>
+                        <a:rPr lang="en-US" sz="1500" dirty="0"/>
+                        <a:t>8</a:t>
+                      </a:r>
+                    </a:p>
+                  </a:txBody>
+                  <a:tcPr/>
+                </a:tc>
+                <a:tc>
+                  <a:txBody>
+                    <a:bodyPr/>
+                    <a:lstStyle/>
+                    <a:p>
+                      <a:r>
+                        <a:rPr lang="en-US" sz="1500" dirty="0" err="1"/>
+                        <a:t>DynThings</a:t>
+                      </a:r>
+                      <a:r>
+                        <a:rPr lang="en-US" sz="1500" baseline="0" dirty="0"/>
+                        <a:t> Main Application</a:t>
+                      </a:r>
+                      <a:endParaRPr lang="en-US" sz="1500" dirty="0"/>
+                    </a:p>
+                  </a:txBody>
+                  <a:tcPr/>
+                </a:tc>
+                <a:extLst>
+                  <a:ext uri="{0D108BD9-81ED-4DB2-BD59-A6C34878D82A}">
+                    <a16:rowId xmlns:a16="http://schemas.microsoft.com/office/drawing/2014/main" val="1056879409"/>
+                  </a:ext>
+                </a:extLst>
+              </a:tr>
+              <a:tr h="548640">
+                <a:tc>
+                  <a:txBody>
+                    <a:bodyPr/>
+                    <a:lstStyle/>
+                    <a:p>
+                      <a:r>
+                        <a:rPr lang="en-US" sz="1500" dirty="0"/>
+                        <a:t>9</a:t>
+                      </a:r>
+                    </a:p>
+                  </a:txBody>
+                  <a:tcPr/>
+                </a:tc>
+                <a:tc>
+                  <a:txBody>
+                    <a:bodyPr/>
+                    <a:lstStyle/>
+                    <a:p>
+                      <a:r>
+                        <a:rPr lang="en-US" sz="1500" dirty="0"/>
+                        <a:t>Client</a:t>
+                      </a:r>
+                      <a:r>
+                        <a:rPr lang="en-US" sz="1500" baseline="0" dirty="0"/>
+                        <a:t> Application designed for Monitor and Control rooms</a:t>
+                      </a:r>
+                      <a:endParaRPr lang="en-US" sz="1500" dirty="0"/>
+                    </a:p>
+                  </a:txBody>
+                  <a:tcPr/>
+                </a:tc>
+                <a:extLst>
+                  <a:ext uri="{0D108BD9-81ED-4DB2-BD59-A6C34878D82A}">
+                    <a16:rowId xmlns:a16="http://schemas.microsoft.com/office/drawing/2014/main" val="1101019906"/>
+                  </a:ext>
+                </a:extLst>
+              </a:tr>
+              <a:tr h="777240">
+                <a:tc>
+                  <a:txBody>
+                    <a:bodyPr/>
+                    <a:lstStyle/>
+                    <a:p>
+                      <a:r>
+                        <a:rPr lang="en-US" sz="1500" dirty="0"/>
+                        <a:t>10</a:t>
+                      </a:r>
+                    </a:p>
+                  </a:txBody>
+                  <a:tcPr/>
+                </a:tc>
+                <a:tc>
+                  <a:txBody>
+                    <a:bodyPr/>
+                    <a:lstStyle/>
+                    <a:p>
+                      <a:r>
+                        <a:rPr lang="en-US" sz="1500" dirty="0"/>
+                        <a:t>On site Technician</a:t>
+                      </a:r>
+                      <a:r>
+                        <a:rPr lang="en-US" sz="1500" baseline="0" dirty="0"/>
+                        <a:t> can access the platform using the Mobile App.</a:t>
+                      </a:r>
+                      <a:endParaRPr lang="en-US" sz="1500" dirty="0"/>
+                    </a:p>
+                  </a:txBody>
+                  <a:tcPr/>
+                </a:tc>
+                <a:extLst>
+                  <a:ext uri="{0D108BD9-81ED-4DB2-BD59-A6C34878D82A}">
+                    <a16:rowId xmlns:a16="http://schemas.microsoft.com/office/drawing/2014/main" val="2316165823"/>
+                  </a:ext>
+                </a:extLst>
+              </a:tr>
+              <a:tr h="777240">
+                <a:tc>
+                  <a:txBody>
+                    <a:bodyPr/>
+                    <a:lstStyle/>
+                    <a:p>
+                      <a:r>
+                        <a:rPr lang="en-US" sz="1500" dirty="0"/>
+                        <a:t>11</a:t>
+                      </a:r>
+                    </a:p>
+                  </a:txBody>
+                  <a:tcPr/>
+                </a:tc>
+                <a:tc>
+                  <a:txBody>
+                    <a:bodyPr/>
+                    <a:lstStyle/>
+                    <a:p>
+                      <a:pPr marL="0" marR="0" lvl="0" indent="0" algn="l" defTabSz="914400" rtl="0" eaLnBrk="1" fontAlgn="auto" latinLnBrk="0" hangingPunct="1">
+                        <a:lnSpc>
+                          <a:spcPct val="100000"/>
+                        </a:lnSpc>
+                        <a:spcBef>
+                          <a:spcPts val="0"/>
+                        </a:spcBef>
+                        <a:spcAft>
+                          <a:spcPts val="0"/>
+                        </a:spcAft>
+                        <a:buClrTx/>
+                        <a:buSzTx/>
+                        <a:buFontTx/>
+                        <a:buNone/>
+                        <a:tabLst/>
+                        <a:defRPr/>
+                      </a:pPr>
+                      <a:r>
+                        <a:rPr lang="en-US" sz="1500" dirty="0"/>
+                        <a:t>End-Users</a:t>
+                      </a:r>
+                      <a:r>
+                        <a:rPr lang="en-US" sz="1500" baseline="0" dirty="0"/>
+                        <a:t> can access the platform using the Mobile App.</a:t>
+                      </a:r>
+                      <a:endParaRPr lang="en-US" sz="1500" dirty="0"/>
+                    </a:p>
+                    <a:p>
+                      <a:endParaRPr lang="en-US" sz="1500" dirty="0"/>
+                    </a:p>
+                  </a:txBody>
+                  <a:tcPr/>
+                </a:tc>
+                <a:extLst>
+                  <a:ext uri="{0D108BD9-81ED-4DB2-BD59-A6C34878D82A}">
+                    <a16:rowId xmlns:a16="http://schemas.microsoft.com/office/drawing/2014/main" val="1260399645"/>
+                  </a:ext>
+                </a:extLst>
+              </a:tr>
+              <a:tr h="777240">
+                <a:tc>
+                  <a:txBody>
+                    <a:bodyPr/>
+                    <a:lstStyle/>
+                    <a:p>
+                      <a:r>
+                        <a:rPr lang="en-US" sz="1500" dirty="0"/>
+                        <a:t>12</a:t>
+                      </a:r>
+                    </a:p>
+                  </a:txBody>
+                  <a:tcPr/>
+                </a:tc>
+                <a:tc>
+                  <a:txBody>
+                    <a:bodyPr/>
+                    <a:lstStyle/>
+                    <a:p>
+                      <a:r>
+                        <a:rPr lang="en-US" sz="1500" dirty="0"/>
+                        <a:t>3</a:t>
+                      </a:r>
+                      <a:r>
+                        <a:rPr lang="en-US" sz="1500" baseline="30000" dirty="0"/>
+                        <a:t>rd</a:t>
+                      </a:r>
+                      <a:r>
+                        <a:rPr lang="en-US" sz="1500" dirty="0"/>
+                        <a:t> party applications</a:t>
+                      </a:r>
+                      <a:r>
+                        <a:rPr lang="en-US" sz="1500" baseline="0" dirty="0"/>
+                        <a:t> can communicate using API Endpoint</a:t>
+                      </a:r>
+                      <a:endParaRPr lang="en-US" sz="1500" dirty="0"/>
+                    </a:p>
+                  </a:txBody>
+                  <a:tcPr/>
+                </a:tc>
+                <a:extLst>
+                  <a:ext uri="{0D108BD9-81ED-4DB2-BD59-A6C34878D82A}">
+                    <a16:rowId xmlns:a16="http://schemas.microsoft.com/office/drawing/2014/main" val="860857388"/>
+                  </a:ext>
+                </a:extLst>
+              </a:tr>
+              <a:tr h="548640">
+                <a:tc>
+                  <a:txBody>
+                    <a:bodyPr/>
+                    <a:lstStyle/>
+                    <a:p>
+                      <a:r>
+                        <a:rPr lang="en-US" sz="1500" dirty="0"/>
+                        <a:t>13</a:t>
+                      </a:r>
+                    </a:p>
+                  </a:txBody>
+                  <a:tcPr/>
+                </a:tc>
+                <a:tc>
+                  <a:txBody>
+                    <a:bodyPr/>
+                    <a:lstStyle/>
+                    <a:p>
+                      <a:r>
+                        <a:rPr lang="en-US" sz="1500" dirty="0"/>
+                        <a:t>SMS Gateway to send and receive IOs</a:t>
+                      </a:r>
+                      <a:r>
+                        <a:rPr lang="en-US" sz="1500" baseline="0" dirty="0"/>
+                        <a:t> using SMS instead of </a:t>
+                      </a:r>
+                      <a:endParaRPr lang="en-US" sz="1500" dirty="0"/>
+                    </a:p>
+                  </a:txBody>
+                  <a:tcPr/>
+                </a:tc>
+                <a:extLst>
+                  <a:ext uri="{0D108BD9-81ED-4DB2-BD59-A6C34878D82A}">
+                    <a16:rowId xmlns:a16="http://schemas.microsoft.com/office/drawing/2014/main" val="1006986802"/>
+                  </a:ext>
+                </a:extLst>
+              </a:tr>
+            </a:tbl>
+          </a:graphicData>
+        </a:graphic>
+      </p:graphicFrame>
+    </p:spTree>
+    <p:extLst>
+      <p:ext uri="{BB962C8B-B14F-4D97-AF65-F5344CB8AC3E}">
+        <p14:creationId xmlns:p14="http://schemas.microsoft.com/office/powerpoint/2010/main" val="2946019316"/>
+      </p:ext>
+    </p:extLst>
+  </p:cSld>
+  <p:clrMapOvr>
+    <a:masterClrMapping/>
+  </p:clrMapOvr>
 </p:sld>
 </file>
 

</xml_diff>